<commit_message>
New slides, new scripts
</commit_message>
<xml_diff>
--- a/deep-learning-in-practice-with-pytorch/2-cnn-visualization.pptx
+++ b/deep-learning-in-practice-with-pytorch/2-cnn-visualization.pptx
@@ -8,8 +8,12 @@
     <p:sldId id="257" r:id="rId2"/>
     <p:sldId id="258" r:id="rId3"/>
     <p:sldId id="259" r:id="rId4"/>
-    <p:sldId id="260" r:id="rId5"/>
-    <p:sldId id="261" r:id="rId6"/>
+    <p:sldId id="407" r:id="rId5"/>
+    <p:sldId id="408" r:id="rId6"/>
+    <p:sldId id="406" r:id="rId7"/>
+    <p:sldId id="260" r:id="rId8"/>
+    <p:sldId id="261" r:id="rId9"/>
+    <p:sldId id="405" r:id="rId10"/>
   </p:sldIdLst>
   <p:sldSz cx="12192000" cy="6858000"/>
   <p:notesSz cx="6858000" cy="9144000"/>
@@ -1938,7 +1942,11 @@
           <a:bodyPr/>
           <a:lstStyle/>
           <a:p>
-            <a:endParaRPr lang="fr-FR"/>
+            <a:r>
+              <a:rPr lang="fr-FR" dirty="0" err="1"/>
+              <a:t>Outline</a:t>
+            </a:r>
+            <a:endParaRPr lang="fr-FR" dirty="0"/>
           </a:p>
         </p:txBody>
       </p:sp>
@@ -1959,26 +1967,60 @@
           <a:p>
             <a:r>
               <a:rPr lang="it-IT" dirty="0"/>
-              <a:t>This is a new thing</a:t>
-            </a:r>
-          </a:p>
-          <a:p>
-            <a:pPr lvl="1"/>
+              <a:t>xAI: eXplainable AI</a:t>
+            </a:r>
+          </a:p>
+          <a:p>
             <a:r>
               <a:rPr lang="it-IT" dirty="0"/>
-              <a:t>Ciao</a:t>
-            </a:r>
-          </a:p>
-          <a:p>
-            <a:pPr lvl="2"/>
+              <a:t>Visualization of feature patterns</a:t>
+            </a:r>
+          </a:p>
+          <a:p>
             <a:r>
               <a:rPr lang="it-IT" dirty="0"/>
-              <a:t>Ciaooooooooooooooo</a:t>
+              <a:t>Saliency maps</a:t>
+            </a:r>
+          </a:p>
+          <a:p>
+            <a:r>
+              <a:rPr lang="it-IT" dirty="0"/>
+              <a:t>Grad-CAM </a:t>
             </a:r>
             <a:endParaRPr lang="fr-FR" dirty="0"/>
           </a:p>
         </p:txBody>
       </p:sp>
+      <p:pic>
+        <p:nvPicPr>
+          <p:cNvPr id="3" name="Image 2">
+            <a:extLst>
+              <a:ext uri="{FF2B5EF4-FFF2-40B4-BE49-F238E27FC236}">
+                <a16:creationId xmlns:a16="http://schemas.microsoft.com/office/drawing/2014/main" id="{D6877910-35B3-455D-8802-54A5AE864C01}"/>
+              </a:ext>
+            </a:extLst>
+          </p:cNvPr>
+          <p:cNvPicPr>
+            <a:picLocks noChangeAspect="1"/>
+          </p:cNvPicPr>
+          <p:nvPr/>
+        </p:nvPicPr>
+        <p:blipFill>
+          <a:blip r:embed="rId2"/>
+          <a:stretch>
+            <a:fillRect/>
+          </a:stretch>
+        </p:blipFill>
+        <p:spPr>
+          <a:xfrm>
+            <a:off x="7018918" y="1668744"/>
+            <a:ext cx="4334882" cy="4250546"/>
+          </a:xfrm>
+          <a:prstGeom prst="rect">
+            <a:avLst/>
+          </a:prstGeom>
+        </p:spPr>
+      </p:pic>
     </p:spTree>
     <p:extLst>
       <p:ext uri="{BB962C8B-B14F-4D97-AF65-F5344CB8AC3E}">
@@ -2032,7 +2074,7 @@
           <a:p>
             <a:r>
               <a:rPr lang="en-US" dirty="0"/>
-              <a:t>Black box effect is even worse for CNNs</a:t>
+              <a:t>Black-box effect is even worse for CNNs</a:t>
             </a:r>
           </a:p>
         </p:txBody>
@@ -2106,7 +2148,7 @@
           <p:cNvPr id="2" name="Titre 1">
             <a:extLst>
               <a:ext uri="{FF2B5EF4-FFF2-40B4-BE49-F238E27FC236}">
-                <a16:creationId xmlns:a16="http://schemas.microsoft.com/office/drawing/2014/main" id="{D02228F8-2E9C-4B7B-AAC0-587F1402131E}"/>
+                <a16:creationId xmlns:a16="http://schemas.microsoft.com/office/drawing/2014/main" id="{A9394345-7042-4C27-81CB-A48CA06B655A}"/>
               </a:ext>
             </a:extLst>
           </p:cNvPr>
@@ -2123,8 +2165,20 @@
           <a:lstStyle/>
           <a:p>
             <a:r>
+              <a:rPr lang="en-US" dirty="0" err="1"/>
+              <a:t>xAI</a:t>
+            </a:r>
+            <a:r>
               <a:rPr lang="en-US" dirty="0"/>
-              <a:t>Saliency maps</a:t>
+              <a:t>: </a:t>
+            </a:r>
+            <a:r>
+              <a:rPr lang="en-US" dirty="0" err="1"/>
+              <a:t>eXplainable</a:t>
+            </a:r>
+            <a:r>
+              <a:rPr lang="en-US" dirty="0"/>
+              <a:t> AI</a:t>
             </a:r>
           </a:p>
         </p:txBody>
@@ -2134,7 +2188,7 @@
           <p:cNvPr id="3" name="Espace réservé du texte 2">
             <a:extLst>
               <a:ext uri="{FF2B5EF4-FFF2-40B4-BE49-F238E27FC236}">
-                <a16:creationId xmlns:a16="http://schemas.microsoft.com/office/drawing/2014/main" id="{AE11C3D2-6F27-4683-9631-859809B0DB72}"/>
+                <a16:creationId xmlns:a16="http://schemas.microsoft.com/office/drawing/2014/main" id="{74549EF7-49ED-4CAF-96BA-B6CA618048A8}"/>
               </a:ext>
             </a:extLst>
           </p:cNvPr>
@@ -2150,14 +2204,105 @@
           <a:bodyPr/>
           <a:lstStyle/>
           <a:p>
-            <a:endParaRPr lang="en-US"/>
+            <a:r>
+              <a:rPr lang="en-US" dirty="0"/>
+              <a:t>Relatively new research field</a:t>
+            </a:r>
+          </a:p>
+          <a:p>
+            <a:pPr lvl="1"/>
+            <a:r>
+              <a:rPr lang="en-US" dirty="0"/>
+              <a:t>“Open the black box”, answer “Why is it behaving like that?”</a:t>
+            </a:r>
+          </a:p>
+          <a:p>
+            <a:pPr lvl="1"/>
+            <a:r>
+              <a:rPr lang="en-US" b="1" dirty="0"/>
+              <a:t>Local explanation</a:t>
+            </a:r>
+            <a:r>
+              <a:rPr lang="en-US" dirty="0"/>
+              <a:t>: why behavior for </a:t>
+            </a:r>
+            <a:r>
+              <a:rPr lang="en-US" b="1" dirty="0"/>
+              <a:t>this sample</a:t>
+            </a:r>
+            <a:r>
+              <a:rPr lang="en-US" dirty="0"/>
+              <a:t>?</a:t>
+            </a:r>
+          </a:p>
+          <a:p>
+            <a:pPr lvl="1"/>
+            <a:r>
+              <a:rPr lang="en-US" b="1" dirty="0"/>
+              <a:t>Global explanation</a:t>
+            </a:r>
+            <a:r>
+              <a:rPr lang="en-US" dirty="0"/>
+              <a:t>: why behavior in general, or for a class?</a:t>
+            </a:r>
+          </a:p>
+          <a:p>
+            <a:pPr lvl="1"/>
+            <a:endParaRPr lang="en-US" dirty="0"/>
+          </a:p>
+          <a:p>
+            <a:r>
+              <a:rPr lang="en-US" dirty="0"/>
+              <a:t>Ongoing discussion</a:t>
+            </a:r>
+          </a:p>
+          <a:p>
+            <a:pPr lvl="1"/>
+            <a:r>
+              <a:rPr lang="en-US" dirty="0"/>
+              <a:t>What is the definition of </a:t>
+            </a:r>
+            <a:r>
+              <a:rPr lang="en-US" b="1" dirty="0"/>
+              <a:t>explanation</a:t>
+            </a:r>
+            <a:r>
+              <a:rPr lang="en-US" dirty="0"/>
+              <a:t>?</a:t>
+            </a:r>
+          </a:p>
+          <a:p>
+            <a:pPr lvl="1"/>
+            <a:r>
+              <a:rPr lang="en-US" dirty="0"/>
+              <a:t>Difference between </a:t>
+            </a:r>
+            <a:r>
+              <a:rPr lang="en-US" i="1" dirty="0"/>
+              <a:t>explanation</a:t>
+            </a:r>
+            <a:r>
+              <a:rPr lang="en-US" dirty="0"/>
+              <a:t> and </a:t>
+            </a:r>
+            <a:r>
+              <a:rPr lang="en-US" i="1" dirty="0"/>
+              <a:t>interpretation</a:t>
+            </a:r>
+          </a:p>
+          <a:p>
+            <a:pPr lvl="1"/>
+            <a:r>
+              <a:rPr lang="en-US" dirty="0"/>
+              <a:t>Is it possible to build white-box ML algorithms? Yes, but…*</a:t>
+            </a:r>
           </a:p>
         </p:txBody>
       </p:sp>
     </p:spTree>
     <p:extLst>
       <p:ext uri="{BB962C8B-B14F-4D97-AF65-F5344CB8AC3E}">
-        <p14:creationId xmlns:p14="http://schemas.microsoft.com/office/powerpoint/2010/main" val="1702120084"/>
+        <p14:creationId xmlns:p14="http://schemas.microsoft.com/office/powerpoint/2010/main" val="893429738"/>
       </p:ext>
     </p:extLst>
   </p:cSld>
@@ -2189,7 +2334,7 @@
           <p:cNvPr id="2" name="Titre 1">
             <a:extLst>
               <a:ext uri="{FF2B5EF4-FFF2-40B4-BE49-F238E27FC236}">
-                <a16:creationId xmlns:a16="http://schemas.microsoft.com/office/drawing/2014/main" id="{535FA191-EEBA-4AD2-A28A-BB9C1CBDC983}"/>
+                <a16:creationId xmlns:a16="http://schemas.microsoft.com/office/drawing/2014/main" id="{A9394345-7042-4C27-81CB-A48CA06B655A}"/>
               </a:ext>
             </a:extLst>
           </p:cNvPr>
@@ -2206,8 +2351,20 @@
           <a:lstStyle/>
           <a:p>
             <a:r>
-              <a:rPr lang="en-US"/>
-              <a:t>Grad-CAM</a:t>
+              <a:rPr lang="en-US" dirty="0" err="1"/>
+              <a:t>xAI</a:t>
+            </a:r>
+            <a:r>
+              <a:rPr lang="en-US" dirty="0"/>
+              <a:t>: </a:t>
+            </a:r>
+            <a:r>
+              <a:rPr lang="en-US" dirty="0" err="1"/>
+              <a:t>eXplainable</a:t>
+            </a:r>
+            <a:r>
+              <a:rPr lang="en-US" dirty="0"/>
+              <a:t> AI</a:t>
             </a:r>
           </a:p>
         </p:txBody>
@@ -2217,7 +2374,7 @@
           <p:cNvPr id="3" name="Espace réservé du texte 2">
             <a:extLst>
               <a:ext uri="{FF2B5EF4-FFF2-40B4-BE49-F238E27FC236}">
-                <a16:creationId xmlns:a16="http://schemas.microsoft.com/office/drawing/2014/main" id="{46E916FF-1CBD-4F4B-B2A6-B9A34431BA76}"/>
+                <a16:creationId xmlns:a16="http://schemas.microsoft.com/office/drawing/2014/main" id="{74549EF7-49ED-4CAF-96BA-B6CA618048A8}"/>
               </a:ext>
             </a:extLst>
           </p:cNvPr>
@@ -2233,6 +2390,351 @@
           <a:bodyPr/>
           <a:lstStyle/>
           <a:p>
+            <a:r>
+              <a:rPr lang="en-US" dirty="0"/>
+              <a:t>Model-agnostic methods</a:t>
+            </a:r>
+          </a:p>
+          <a:p>
+            <a:pPr lvl="1"/>
+            <a:r>
+              <a:rPr lang="en-US" dirty="0"/>
+              <a:t>LIME</a:t>
+            </a:r>
+          </a:p>
+          <a:p>
+            <a:pPr lvl="1"/>
+            <a:r>
+              <a:rPr lang="en-US" dirty="0"/>
+              <a:t>SHAP/SHAPLY</a:t>
+            </a:r>
+          </a:p>
+          <a:p>
+            <a:pPr lvl="1"/>
+            <a:r>
+              <a:rPr lang="en-US" dirty="0"/>
+              <a:t>Relative feature importance (e.g. permutation importance)</a:t>
+            </a:r>
+          </a:p>
+          <a:p>
+            <a:pPr lvl="1"/>
+            <a:endParaRPr lang="en-US" dirty="0"/>
+          </a:p>
+          <a:p>
+            <a:r>
+              <a:rPr lang="en-US" dirty="0"/>
+              <a:t>For CNNs, we have some model-specific methods</a:t>
+            </a:r>
+          </a:p>
+          <a:p>
+            <a:pPr lvl="1"/>
+            <a:r>
+              <a:rPr lang="en-US" dirty="0"/>
+              <a:t>Since the models are performing </a:t>
+            </a:r>
+            <a:r>
+              <a:rPr lang="en-US" b="1" dirty="0"/>
+              <a:t>feature construction/extraction</a:t>
+            </a:r>
+          </a:p>
+          <a:p>
+            <a:pPr lvl="1"/>
+            <a:r>
+              <a:rPr lang="en-US" dirty="0"/>
+              <a:t>We are not even sure of </a:t>
+            </a:r>
+            <a:r>
+              <a:rPr lang="en-US" i="1" dirty="0"/>
+              <a:t>what the features are</a:t>
+            </a:r>
+            <a:r>
+              <a:rPr lang="en-US" dirty="0"/>
+              <a:t>!</a:t>
+            </a:r>
+          </a:p>
+        </p:txBody>
+      </p:sp>
+    </p:spTree>
+    <p:extLst>
+      <p:ext uri="{BB962C8B-B14F-4D97-AF65-F5344CB8AC3E}">
+        <p14:creationId xmlns:p14="http://schemas.microsoft.com/office/powerpoint/2010/main" val="2718011526"/>
+      </p:ext>
+    </p:extLst>
+  </p:cSld>
+  <p:clrMapOvr>
+    <a:masterClrMapping/>
+  </p:clrMapOvr>
+</p:sld>
+</file>
+
+<file path=ppt/slides/slide6.xml><?xml version="1.0" encoding="utf-8"?>
+<p:sld xmlns:a="http://schemas.openxmlformats.org/drawingml/2006/main" xmlns:r="http://schemas.openxmlformats.org/officeDocument/2006/relationships" xmlns:p="http://schemas.openxmlformats.org/presentationml/2006/main">
+  <p:cSld>
+    <p:spTree>
+      <p:nvGrpSpPr>
+        <p:cNvPr id="1" name=""/>
+        <p:cNvGrpSpPr/>
+        <p:nvPr/>
+      </p:nvGrpSpPr>
+      <p:grpSpPr>
+        <a:xfrm>
+          <a:off x="0" y="0"/>
+          <a:ext cx="0" cy="0"/>
+          <a:chOff x="0" y="0"/>
+          <a:chExt cx="0" cy="0"/>
+        </a:xfrm>
+      </p:grpSpPr>
+      <p:sp>
+        <p:nvSpPr>
+          <p:cNvPr id="2" name="Titre 1">
+            <a:extLst>
+              <a:ext uri="{FF2B5EF4-FFF2-40B4-BE49-F238E27FC236}">
+                <a16:creationId xmlns:a16="http://schemas.microsoft.com/office/drawing/2014/main" id="{ABB448C6-E53D-47E5-AE4F-33FF6E835D83}"/>
+              </a:ext>
+            </a:extLst>
+          </p:cNvPr>
+          <p:cNvSpPr>
+            <a:spLocks noGrp="1"/>
+          </p:cNvSpPr>
+          <p:nvPr>
+            <p:ph type="title"/>
+          </p:nvPr>
+        </p:nvSpPr>
+        <p:spPr/>
+        <p:txBody>
+          <a:bodyPr/>
+          <a:lstStyle/>
+          <a:p>
+            <a:r>
+              <a:rPr lang="en-US" dirty="0"/>
+              <a:t>Visualization of feature patterns</a:t>
+            </a:r>
+          </a:p>
+        </p:txBody>
+      </p:sp>
+      <p:sp>
+        <p:nvSpPr>
+          <p:cNvPr id="3" name="Espace réservé du texte 2">
+            <a:extLst>
+              <a:ext uri="{FF2B5EF4-FFF2-40B4-BE49-F238E27FC236}">
+                <a16:creationId xmlns:a16="http://schemas.microsoft.com/office/drawing/2014/main" id="{9DE34A11-A934-4036-856C-A1072862230D}"/>
+              </a:ext>
+            </a:extLst>
+          </p:cNvPr>
+          <p:cNvSpPr>
+            <a:spLocks noGrp="1"/>
+          </p:cNvSpPr>
+          <p:nvPr>
+            <p:ph type="body" sz="quarter" idx="10"/>
+          </p:nvPr>
+        </p:nvSpPr>
+        <p:spPr/>
+        <p:txBody>
+          <a:bodyPr/>
+          <a:lstStyle/>
+          <a:p>
+            <a:endParaRPr lang="en-US"/>
+          </a:p>
+        </p:txBody>
+      </p:sp>
+      <p:pic>
+        <p:nvPicPr>
+          <p:cNvPr id="4" name="Image 3">
+            <a:extLst>
+              <a:ext uri="{FF2B5EF4-FFF2-40B4-BE49-F238E27FC236}">
+                <a16:creationId xmlns:a16="http://schemas.microsoft.com/office/drawing/2014/main" id="{88DC0455-AF05-4F15-861F-DB755C8899A4}"/>
+              </a:ext>
+            </a:extLst>
+          </p:cNvPr>
+          <p:cNvPicPr>
+            <a:picLocks noChangeAspect="1"/>
+          </p:cNvPicPr>
+          <p:nvPr/>
+        </p:nvPicPr>
+        <p:blipFill>
+          <a:blip r:embed="rId2">
+            <a:extLst>
+              <a:ext uri="{28A0092B-C50C-407E-A947-70E740481C1C}">
+                <a14:useLocalDpi xmlns:a14="http://schemas.microsoft.com/office/drawing/2010/main" val="0"/>
+              </a:ext>
+            </a:extLst>
+          </a:blip>
+          <a:stretch>
+            <a:fillRect/>
+          </a:stretch>
+        </p:blipFill>
+        <p:spPr>
+          <a:xfrm>
+            <a:off x="2143125" y="1384778"/>
+            <a:ext cx="7905750" cy="4752975"/>
+          </a:xfrm>
+          <a:prstGeom prst="rect">
+            <a:avLst/>
+          </a:prstGeom>
+        </p:spPr>
+      </p:pic>
+    </p:spTree>
+    <p:extLst>
+      <p:ext uri="{BB962C8B-B14F-4D97-AF65-F5344CB8AC3E}">
+        <p14:creationId xmlns:p14="http://schemas.microsoft.com/office/powerpoint/2010/main" val="1327759371"/>
+      </p:ext>
+    </p:extLst>
+  </p:cSld>
+  <p:clrMapOvr>
+    <a:masterClrMapping/>
+  </p:clrMapOvr>
+</p:sld>
+</file>
+
+<file path=ppt/slides/slide7.xml><?xml version="1.0" encoding="utf-8"?>
+<p:sld xmlns:a="http://schemas.openxmlformats.org/drawingml/2006/main" xmlns:r="http://schemas.openxmlformats.org/officeDocument/2006/relationships" xmlns:p="http://schemas.openxmlformats.org/presentationml/2006/main">
+  <p:cSld>
+    <p:spTree>
+      <p:nvGrpSpPr>
+        <p:cNvPr id="1" name=""/>
+        <p:cNvGrpSpPr/>
+        <p:nvPr/>
+      </p:nvGrpSpPr>
+      <p:grpSpPr>
+        <a:xfrm>
+          <a:off x="0" y="0"/>
+          <a:ext cx="0" cy="0"/>
+          <a:chOff x="0" y="0"/>
+          <a:chExt cx="0" cy="0"/>
+        </a:xfrm>
+      </p:grpSpPr>
+      <p:sp>
+        <p:nvSpPr>
+          <p:cNvPr id="2" name="Titre 1">
+            <a:extLst>
+              <a:ext uri="{FF2B5EF4-FFF2-40B4-BE49-F238E27FC236}">
+                <a16:creationId xmlns:a16="http://schemas.microsoft.com/office/drawing/2014/main" id="{D02228F8-2E9C-4B7B-AAC0-587F1402131E}"/>
+              </a:ext>
+            </a:extLst>
+          </p:cNvPr>
+          <p:cNvSpPr>
+            <a:spLocks noGrp="1"/>
+          </p:cNvSpPr>
+          <p:nvPr>
+            <p:ph type="title"/>
+          </p:nvPr>
+        </p:nvSpPr>
+        <p:spPr/>
+        <p:txBody>
+          <a:bodyPr/>
+          <a:lstStyle/>
+          <a:p>
+            <a:r>
+              <a:rPr lang="en-US" dirty="0"/>
+              <a:t>Saliency maps</a:t>
+            </a:r>
+          </a:p>
+        </p:txBody>
+      </p:sp>
+      <p:sp>
+        <p:nvSpPr>
+          <p:cNvPr id="3" name="Espace réservé du texte 2">
+            <a:extLst>
+              <a:ext uri="{FF2B5EF4-FFF2-40B4-BE49-F238E27FC236}">
+                <a16:creationId xmlns:a16="http://schemas.microsoft.com/office/drawing/2014/main" id="{AE11C3D2-6F27-4683-9631-859809B0DB72}"/>
+              </a:ext>
+            </a:extLst>
+          </p:cNvPr>
+          <p:cNvSpPr>
+            <a:spLocks noGrp="1"/>
+          </p:cNvSpPr>
+          <p:nvPr>
+            <p:ph type="body" sz="quarter" idx="10"/>
+          </p:nvPr>
+        </p:nvSpPr>
+        <p:spPr/>
+        <p:txBody>
+          <a:bodyPr/>
+          <a:lstStyle/>
+          <a:p>
+            <a:endParaRPr lang="en-US"/>
+          </a:p>
+        </p:txBody>
+      </p:sp>
+    </p:spTree>
+    <p:extLst>
+      <p:ext uri="{BB962C8B-B14F-4D97-AF65-F5344CB8AC3E}">
+        <p14:creationId xmlns:p14="http://schemas.microsoft.com/office/powerpoint/2010/main" val="1702120084"/>
+      </p:ext>
+    </p:extLst>
+  </p:cSld>
+  <p:clrMapOvr>
+    <a:masterClrMapping/>
+  </p:clrMapOvr>
+</p:sld>
+</file>
+
+<file path=ppt/slides/slide8.xml><?xml version="1.0" encoding="utf-8"?>
+<p:sld xmlns:a="http://schemas.openxmlformats.org/drawingml/2006/main" xmlns:r="http://schemas.openxmlformats.org/officeDocument/2006/relationships" xmlns:p="http://schemas.openxmlformats.org/presentationml/2006/main">
+  <p:cSld>
+    <p:spTree>
+      <p:nvGrpSpPr>
+        <p:cNvPr id="1" name=""/>
+        <p:cNvGrpSpPr/>
+        <p:nvPr/>
+      </p:nvGrpSpPr>
+      <p:grpSpPr>
+        <a:xfrm>
+          <a:off x="0" y="0"/>
+          <a:ext cx="0" cy="0"/>
+          <a:chOff x="0" y="0"/>
+          <a:chExt cx="0" cy="0"/>
+        </a:xfrm>
+      </p:grpSpPr>
+      <p:sp>
+        <p:nvSpPr>
+          <p:cNvPr id="2" name="Titre 1">
+            <a:extLst>
+              <a:ext uri="{FF2B5EF4-FFF2-40B4-BE49-F238E27FC236}">
+                <a16:creationId xmlns:a16="http://schemas.microsoft.com/office/drawing/2014/main" id="{535FA191-EEBA-4AD2-A28A-BB9C1CBDC983}"/>
+              </a:ext>
+            </a:extLst>
+          </p:cNvPr>
+          <p:cNvSpPr>
+            <a:spLocks noGrp="1"/>
+          </p:cNvSpPr>
+          <p:nvPr>
+            <p:ph type="title"/>
+          </p:nvPr>
+        </p:nvSpPr>
+        <p:spPr/>
+        <p:txBody>
+          <a:bodyPr/>
+          <a:lstStyle/>
+          <a:p>
+            <a:r>
+              <a:rPr lang="en-US"/>
+              <a:t>Grad-CAM</a:t>
+            </a:r>
+          </a:p>
+        </p:txBody>
+      </p:sp>
+      <p:sp>
+        <p:nvSpPr>
+          <p:cNvPr id="3" name="Espace réservé du texte 2">
+            <a:extLst>
+              <a:ext uri="{FF2B5EF4-FFF2-40B4-BE49-F238E27FC236}">
+                <a16:creationId xmlns:a16="http://schemas.microsoft.com/office/drawing/2014/main" id="{46E916FF-1CBD-4F4B-B2A6-B9A34431BA76}"/>
+              </a:ext>
+            </a:extLst>
+          </p:cNvPr>
+          <p:cNvSpPr>
+            <a:spLocks noGrp="1"/>
+          </p:cNvSpPr>
+          <p:nvPr>
+            <p:ph type="body" sz="quarter" idx="10"/>
+          </p:nvPr>
+        </p:nvSpPr>
+        <p:spPr/>
+        <p:txBody>
+          <a:bodyPr/>
+          <a:lstStyle/>
+          <a:p>
             <a:endParaRPr lang="en-US"/>
           </a:p>
         </p:txBody>
@@ -2241,6 +2743,260 @@
     <p:extLst>
       <p:ext uri="{BB962C8B-B14F-4D97-AF65-F5344CB8AC3E}">
         <p14:creationId xmlns:p14="http://schemas.microsoft.com/office/powerpoint/2010/main" val="4139102508"/>
+      </p:ext>
+    </p:extLst>
+  </p:cSld>
+  <p:clrMapOvr>
+    <a:masterClrMapping/>
+  </p:clrMapOvr>
+</p:sld>
+</file>
+
+<file path=ppt/slides/slide9.xml><?xml version="1.0" encoding="utf-8"?>
+<p:sld xmlns:a="http://schemas.openxmlformats.org/drawingml/2006/main" xmlns:r="http://schemas.openxmlformats.org/officeDocument/2006/relationships" xmlns:p="http://schemas.openxmlformats.org/presentationml/2006/main">
+  <p:cSld>
+    <p:spTree>
+      <p:nvGrpSpPr>
+        <p:cNvPr id="1" name=""/>
+        <p:cNvGrpSpPr/>
+        <p:nvPr/>
+      </p:nvGrpSpPr>
+      <p:grpSpPr>
+        <a:xfrm>
+          <a:off x="0" y="0"/>
+          <a:ext cx="0" cy="0"/>
+          <a:chOff x="0" y="0"/>
+          <a:chExt cx="0" cy="0"/>
+        </a:xfrm>
+      </p:grpSpPr>
+      <p:sp>
+        <p:nvSpPr>
+          <p:cNvPr id="4" name="Titre 3">
+            <a:extLst>
+              <a:ext uri="{FF2B5EF4-FFF2-40B4-BE49-F238E27FC236}">
+                <a16:creationId xmlns:a16="http://schemas.microsoft.com/office/drawing/2014/main" id="{B53E8A05-42BD-489E-BF5F-958C213739DF}"/>
+              </a:ext>
+            </a:extLst>
+          </p:cNvPr>
+          <p:cNvSpPr>
+            <a:spLocks noGrp="1"/>
+          </p:cNvSpPr>
+          <p:nvPr>
+            <p:ph type="ctrTitle"/>
+          </p:nvPr>
+        </p:nvSpPr>
+        <p:spPr/>
+        <p:txBody>
+          <a:bodyPr/>
+          <a:lstStyle/>
+          <a:p>
+            <a:r>
+              <a:rPr lang="en-US" dirty="0"/>
+              <a:t>Questions?</a:t>
+            </a:r>
+          </a:p>
+        </p:txBody>
+      </p:sp>
+      <p:sp>
+        <p:nvSpPr>
+          <p:cNvPr id="5" name="Sous-titre 4">
+            <a:extLst>
+              <a:ext uri="{FF2B5EF4-FFF2-40B4-BE49-F238E27FC236}">
+                <a16:creationId xmlns:a16="http://schemas.microsoft.com/office/drawing/2014/main" id="{CEB63DBD-0FC0-4057-AC92-1717C1D0ED55}"/>
+              </a:ext>
+            </a:extLst>
+          </p:cNvPr>
+          <p:cNvSpPr>
+            <a:spLocks noGrp="1"/>
+          </p:cNvSpPr>
+          <p:nvPr>
+            <p:ph type="subTitle" idx="1"/>
+          </p:nvPr>
+        </p:nvSpPr>
+        <p:spPr/>
+        <p:txBody>
+          <a:bodyPr>
+            <a:noAutofit/>
+          </a:bodyPr>
+          <a:lstStyle/>
+          <a:p>
+            <a:r>
+              <a:rPr lang="en-US" dirty="0"/>
+              <a:t>Bibliography</a:t>
+            </a:r>
+            <a:br>
+              <a:rPr lang="en-US" dirty="0"/>
+            </a:br>
+            <a:r>
+              <a:rPr lang="en-US" dirty="0"/>
+              <a:t>- </a:t>
+            </a:r>
+            <a:r>
+              <a:rPr lang="en-US" sz="1800" dirty="0" err="1"/>
+              <a:t>Selvaraju</a:t>
+            </a:r>
+            <a:r>
+              <a:rPr lang="en-US" sz="1800" dirty="0"/>
+              <a:t>, R. R., Cogswell, M., Das, A., </a:t>
+            </a:r>
+            <a:r>
+              <a:rPr lang="en-US" sz="1800" dirty="0" err="1"/>
+              <a:t>Vedantam</a:t>
+            </a:r>
+            <a:r>
+              <a:rPr lang="en-US" sz="1800" dirty="0"/>
+              <a:t>, R., Parikh, D., &amp; Batra, D. (2017). Grad-cam: Visual explanations from deep networks via gradient-based localization. In Proceedings of the IEEE international conference on computer vision (pp. 618-626).</a:t>
+            </a:r>
+            <a:br>
+              <a:rPr lang="en-US" sz="1800" dirty="0"/>
+            </a:br>
+            <a:r>
+              <a:rPr lang="en-US" sz="1800" dirty="0"/>
+              <a:t>- </a:t>
+            </a:r>
+            <a:r>
+              <a:rPr lang="en-US" sz="1800" dirty="0" err="1"/>
+              <a:t>Springenberg</a:t>
+            </a:r>
+            <a:r>
+              <a:rPr lang="en-US" sz="1800" dirty="0"/>
+              <a:t>, J. T., </a:t>
+            </a:r>
+            <a:r>
+              <a:rPr lang="en-US" sz="1800" dirty="0" err="1"/>
+              <a:t>Dosovitskiy</a:t>
+            </a:r>
+            <a:r>
+              <a:rPr lang="en-US" sz="1800" dirty="0"/>
+              <a:t>, A., </a:t>
+            </a:r>
+            <a:r>
+              <a:rPr lang="en-US" sz="1800" dirty="0" err="1"/>
+              <a:t>Brox</a:t>
+            </a:r>
+            <a:r>
+              <a:rPr lang="en-US" sz="1800" dirty="0"/>
+              <a:t>, T., &amp; </a:t>
+            </a:r>
+            <a:r>
+              <a:rPr lang="en-US" sz="1800" dirty="0" err="1"/>
+              <a:t>Riedmiller</a:t>
+            </a:r>
+            <a:r>
+              <a:rPr lang="en-US" sz="1800" dirty="0"/>
+              <a:t>, M. (2014). Striving for simplicity: The all convolutional net. </a:t>
+            </a:r>
+            <a:r>
+              <a:rPr lang="en-US" sz="1800" dirty="0" err="1"/>
+              <a:t>arXiv</a:t>
+            </a:r>
+            <a:r>
+              <a:rPr lang="en-US" sz="1800" dirty="0"/>
+              <a:t> preprint arXiv:1412.6806.</a:t>
+            </a:r>
+          </a:p>
+          <a:p>
+            <a:r>
+              <a:rPr lang="en-US" sz="1400" dirty="0"/>
+              <a:t>Images and videos: unless otherwise stated, I stole them from the Internet. I hope they are not copyrighted, or that their use falls under the Fair Use clause, and if not, I am sorry. Please don’t sue me.</a:t>
+            </a:r>
+          </a:p>
+        </p:txBody>
+      </p:sp>
+      <p:pic>
+        <p:nvPicPr>
+          <p:cNvPr id="6" name="Picture 2">
+            <a:extLst>
+              <a:ext uri="{FF2B5EF4-FFF2-40B4-BE49-F238E27FC236}">
+                <a16:creationId xmlns:a16="http://schemas.microsoft.com/office/drawing/2014/main" id="{6E214693-AB7E-4C54-8D7C-0391735F7C4F}"/>
+              </a:ext>
+            </a:extLst>
+          </p:cNvPr>
+          <p:cNvPicPr>
+            <a:picLocks noChangeAspect="1" noChangeArrowheads="1"/>
+          </p:cNvPicPr>
+          <p:nvPr/>
+        </p:nvPicPr>
+        <p:blipFill rotWithShape="1">
+          <a:blip r:embed="rId2" cstate="print">
+            <a:extLst>
+              <a:ext uri="{BEBA8EAE-BF5A-486C-A8C5-ECC9F3942E4B}">
+                <a14:imgProps xmlns:a14="http://schemas.microsoft.com/office/drawing/2010/main">
+                  <a14:imgLayer r:embed="rId3">
+                    <a14:imgEffect>
+                      <a14:backgroundRemoval t="22283" b="75673" l="54554" r="90983"/>
+                    </a14:imgEffect>
+                  </a14:imgLayer>
+                </a14:imgProps>
+              </a:ext>
+              <a:ext uri="{28A0092B-C50C-407E-A947-70E740481C1C}">
+                <a14:useLocalDpi xmlns:a14="http://schemas.microsoft.com/office/drawing/2010/main" val="0"/>
+              </a:ext>
+            </a:extLst>
+          </a:blip>
+          <a:srcRect l="50000" t="15610" r="4463" b="17653"/>
+          <a:stretch/>
+        </p:blipFill>
+        <p:spPr bwMode="auto">
+          <a:xfrm>
+            <a:off x="4938382" y="1037974"/>
+            <a:ext cx="1295445" cy="884352"/>
+          </a:xfrm>
+          <a:prstGeom prst="rect">
+            <a:avLst/>
+          </a:prstGeom>
+          <a:noFill/>
+          <a:extLst>
+            <a:ext uri="{909E8E84-426E-40DD-AFC4-6F175D3DCCD1}">
+              <a14:hiddenFill xmlns:a14="http://schemas.microsoft.com/office/drawing/2010/main">
+                <a:solidFill>
+                  <a:srgbClr val="FFFFFF"/>
+                </a:solidFill>
+              </a14:hiddenFill>
+            </a:ext>
+          </a:extLst>
+        </p:spPr>
+      </p:pic>
+      <p:pic>
+        <p:nvPicPr>
+          <p:cNvPr id="7" name="Image 6">
+            <a:extLst>
+              <a:ext uri="{FF2B5EF4-FFF2-40B4-BE49-F238E27FC236}">
+                <a16:creationId xmlns:a16="http://schemas.microsoft.com/office/drawing/2014/main" id="{414D43F9-35B6-46FA-B5D4-8F2F1AA72ED1}"/>
+              </a:ext>
+            </a:extLst>
+          </p:cNvPr>
+          <p:cNvPicPr>
+            <a:picLocks noChangeAspect="1"/>
+          </p:cNvPicPr>
+          <p:nvPr/>
+        </p:nvPicPr>
+        <p:blipFill>
+          <a:blip r:embed="rId4">
+            <a:extLst>
+              <a:ext uri="{28A0092B-C50C-407E-A947-70E740481C1C}">
+                <a14:useLocalDpi xmlns:a14="http://schemas.microsoft.com/office/drawing/2010/main" val="0"/>
+              </a:ext>
+            </a:extLst>
+          </a:blip>
+          <a:stretch>
+            <a:fillRect/>
+          </a:stretch>
+        </p:blipFill>
+        <p:spPr>
+          <a:xfrm>
+            <a:off x="6383826" y="1073027"/>
+            <a:ext cx="1642424" cy="574848"/>
+          </a:xfrm>
+          <a:prstGeom prst="rect">
+            <a:avLst/>
+          </a:prstGeom>
+        </p:spPr>
+      </p:pic>
+    </p:spTree>
+    <p:extLst>
+      <p:ext uri="{BB962C8B-B14F-4D97-AF65-F5344CB8AC3E}">
+        <p14:creationId xmlns:p14="http://schemas.microsoft.com/office/powerpoint/2010/main" val="938009228"/>
       </p:ext>
     </p:extLst>
   </p:cSld>

</xml_diff>

<commit_message>
New slides and notebook for RNNs
</commit_message>
<xml_diff>
--- a/deep-learning-in-practice-with-pytorch/2-cnn-visualization.pptx
+++ b/deep-learning-in-practice-with-pytorch/2-cnn-visualization.pptx
@@ -11,9 +11,11 @@
     <p:sldId id="407" r:id="rId5"/>
     <p:sldId id="408" r:id="rId6"/>
     <p:sldId id="406" r:id="rId7"/>
-    <p:sldId id="260" r:id="rId8"/>
-    <p:sldId id="261" r:id="rId9"/>
-    <p:sldId id="405" r:id="rId10"/>
+    <p:sldId id="409" r:id="rId8"/>
+    <p:sldId id="410" r:id="rId9"/>
+    <p:sldId id="260" r:id="rId10"/>
+    <p:sldId id="261" r:id="rId11"/>
+    <p:sldId id="405" r:id="rId12"/>
   </p:sldIdLst>
   <p:sldSz cx="12192000" cy="6858000"/>
   <p:notesSz cx="6858000" cy="9144000"/>
@@ -1402,16 +1404,7 @@
                 </a:solidFill>
                 <a:latin typeface="+mn-lt"/>
               </a:rPr>
-              <a:t>TITLE OF THE PRESENTATION HERE (MODIFY IN VIEW -&gt; MASK</a:t>
-            </a:r>
-            <a:r>
-              <a:rPr lang="it-IT" sz="1000" baseline="0" dirty="0">
-                <a:solidFill>
-                  <a:srgbClr val="275662"/>
-                </a:solidFill>
-                <a:latin typeface="+mn-lt"/>
-              </a:rPr>
-              <a:t> / AFFICHAGE -&gt; MASQUE DE DIAPOSITIVES) </a:t>
+              <a:t>MAKING SENSE OF CNNs: VISUALIZATION TECHNIQUES</a:t>
             </a:r>
             <a:endParaRPr lang="fr-FR" sz="1000" dirty="0">
               <a:solidFill>
@@ -1910,6 +1903,554 @@
 </p:sld>
 </file>
 
+<file path=ppt/slides/slide10.xml><?xml version="1.0" encoding="utf-8"?>
+<p:sld xmlns:a="http://schemas.openxmlformats.org/drawingml/2006/main" xmlns:r="http://schemas.openxmlformats.org/officeDocument/2006/relationships" xmlns:p="http://schemas.openxmlformats.org/presentationml/2006/main">
+  <p:cSld>
+    <p:spTree>
+      <p:nvGrpSpPr>
+        <p:cNvPr id="1" name=""/>
+        <p:cNvGrpSpPr/>
+        <p:nvPr/>
+      </p:nvGrpSpPr>
+      <p:grpSpPr>
+        <a:xfrm>
+          <a:off x="0" y="0"/>
+          <a:ext cx="0" cy="0"/>
+          <a:chOff x="0" y="0"/>
+          <a:chExt cx="0" cy="0"/>
+        </a:xfrm>
+      </p:grpSpPr>
+      <p:sp>
+        <p:nvSpPr>
+          <p:cNvPr id="2" name="Titre 1">
+            <a:extLst>
+              <a:ext uri="{FF2B5EF4-FFF2-40B4-BE49-F238E27FC236}">
+                <a16:creationId xmlns:a16="http://schemas.microsoft.com/office/drawing/2014/main" id="{535FA191-EEBA-4AD2-A28A-BB9C1CBDC983}"/>
+              </a:ext>
+            </a:extLst>
+          </p:cNvPr>
+          <p:cNvSpPr>
+            <a:spLocks noGrp="1"/>
+          </p:cNvSpPr>
+          <p:nvPr>
+            <p:ph type="title"/>
+          </p:nvPr>
+        </p:nvSpPr>
+        <p:spPr/>
+        <p:txBody>
+          <a:bodyPr/>
+          <a:lstStyle/>
+          <a:p>
+            <a:r>
+              <a:rPr lang="en-US"/>
+              <a:t>Grad-CAM</a:t>
+            </a:r>
+          </a:p>
+        </p:txBody>
+      </p:sp>
+      <p:sp>
+        <p:nvSpPr>
+          <p:cNvPr id="3" name="Espace réservé du texte 2">
+            <a:extLst>
+              <a:ext uri="{FF2B5EF4-FFF2-40B4-BE49-F238E27FC236}">
+                <a16:creationId xmlns:a16="http://schemas.microsoft.com/office/drawing/2014/main" id="{46E916FF-1CBD-4F4B-B2A6-B9A34431BA76}"/>
+              </a:ext>
+            </a:extLst>
+          </p:cNvPr>
+          <p:cNvSpPr>
+            <a:spLocks noGrp="1"/>
+          </p:cNvSpPr>
+          <p:nvPr>
+            <p:ph type="body" sz="quarter" idx="10"/>
+          </p:nvPr>
+        </p:nvSpPr>
+        <p:spPr/>
+        <p:txBody>
+          <a:bodyPr/>
+          <a:lstStyle/>
+          <a:p>
+            <a:r>
+              <a:rPr lang="en-US" dirty="0"/>
+              <a:t>Looking at </a:t>
+            </a:r>
+            <a:r>
+              <a:rPr lang="en-US" i="1" dirty="0"/>
+              <a:t>one single pixel</a:t>
+            </a:r>
+            <a:r>
+              <a:rPr lang="en-US" dirty="0"/>
+              <a:t> at the time not very informative</a:t>
+            </a:r>
+          </a:p>
+          <a:p>
+            <a:pPr lvl="1"/>
+            <a:r>
+              <a:rPr lang="en-US" dirty="0"/>
+              <a:t>Later CNN filters (high-level features) map to </a:t>
+            </a:r>
+            <a:r>
+              <a:rPr lang="en-US" i="1" dirty="0"/>
+              <a:t>image areas</a:t>
+            </a:r>
+          </a:p>
+          <a:p>
+            <a:pPr lvl="1"/>
+            <a:r>
+              <a:rPr lang="en-US" dirty="0"/>
+              <a:t>Can’t we do the same as saliency maps, but image areas?</a:t>
+            </a:r>
+          </a:p>
+          <a:p>
+            <a:r>
+              <a:rPr lang="en-US" dirty="0"/>
+              <a:t>Gradient-weighted Class Activation Maps</a:t>
+            </a:r>
+          </a:p>
+          <a:p>
+            <a:pPr lvl="1"/>
+            <a:r>
+              <a:rPr lang="en-US" dirty="0"/>
+              <a:t>Focus is on a </a:t>
+            </a:r>
+            <a:r>
+              <a:rPr lang="en-US" b="1" dirty="0"/>
+              <a:t>target class</a:t>
+            </a:r>
+            <a:r>
+              <a:rPr lang="en-US" dirty="0"/>
+              <a:t> for a classification problem</a:t>
+            </a:r>
+          </a:p>
+          <a:p>
+            <a:pPr lvl="1"/>
+            <a:r>
+              <a:rPr lang="en-US" dirty="0"/>
+              <a:t>Outputs of </a:t>
+            </a:r>
+            <a:r>
+              <a:rPr lang="en-US" b="1" dirty="0"/>
+              <a:t>target layer(s)</a:t>
+            </a:r>
+            <a:r>
+              <a:rPr lang="en-US" dirty="0"/>
+              <a:t> more important for final decision?</a:t>
+            </a:r>
+          </a:p>
+          <a:p>
+            <a:r>
+              <a:rPr lang="en-US" dirty="0"/>
+              <a:t>Obstacle: last part of CNN is a very complex set of non-linearities, hard to interpret</a:t>
+            </a:r>
+          </a:p>
+          <a:p>
+            <a:r>
+              <a:rPr lang="en-US" dirty="0"/>
+              <a:t>Solution: replace it with a linear classifier, retrain it</a:t>
+            </a:r>
+          </a:p>
+        </p:txBody>
+      </p:sp>
+    </p:spTree>
+    <p:extLst>
+      <p:ext uri="{BB962C8B-B14F-4D97-AF65-F5344CB8AC3E}">
+        <p14:creationId xmlns:p14="http://schemas.microsoft.com/office/powerpoint/2010/main" val="4139102508"/>
+      </p:ext>
+    </p:extLst>
+  </p:cSld>
+  <p:clrMapOvr>
+    <a:masterClrMapping/>
+  </p:clrMapOvr>
+</p:sld>
+</file>
+
+<file path=ppt/slides/slide11.xml><?xml version="1.0" encoding="utf-8"?>
+<p:sld xmlns:a="http://schemas.openxmlformats.org/drawingml/2006/main" xmlns:r="http://schemas.openxmlformats.org/officeDocument/2006/relationships" xmlns:p="http://schemas.openxmlformats.org/presentationml/2006/main">
+  <p:cSld>
+    <p:spTree>
+      <p:nvGrpSpPr>
+        <p:cNvPr id="1" name=""/>
+        <p:cNvGrpSpPr/>
+        <p:nvPr/>
+      </p:nvGrpSpPr>
+      <p:grpSpPr>
+        <a:xfrm>
+          <a:off x="0" y="0"/>
+          <a:ext cx="0" cy="0"/>
+          <a:chOff x="0" y="0"/>
+          <a:chExt cx="0" cy="0"/>
+        </a:xfrm>
+      </p:grpSpPr>
+      <p:sp>
+        <p:nvSpPr>
+          <p:cNvPr id="4" name="Titre 3">
+            <a:extLst>
+              <a:ext uri="{FF2B5EF4-FFF2-40B4-BE49-F238E27FC236}">
+                <a16:creationId xmlns:a16="http://schemas.microsoft.com/office/drawing/2014/main" id="{B53E8A05-42BD-489E-BF5F-958C213739DF}"/>
+              </a:ext>
+            </a:extLst>
+          </p:cNvPr>
+          <p:cNvSpPr>
+            <a:spLocks noGrp="1"/>
+          </p:cNvSpPr>
+          <p:nvPr>
+            <p:ph type="ctrTitle"/>
+          </p:nvPr>
+        </p:nvSpPr>
+        <p:spPr/>
+        <p:txBody>
+          <a:bodyPr/>
+          <a:lstStyle/>
+          <a:p>
+            <a:r>
+              <a:rPr lang="en-US" dirty="0"/>
+              <a:t>Questions?</a:t>
+            </a:r>
+          </a:p>
+        </p:txBody>
+      </p:sp>
+      <p:sp>
+        <p:nvSpPr>
+          <p:cNvPr id="5" name="Sous-titre 4">
+            <a:extLst>
+              <a:ext uri="{FF2B5EF4-FFF2-40B4-BE49-F238E27FC236}">
+                <a16:creationId xmlns:a16="http://schemas.microsoft.com/office/drawing/2014/main" id="{CEB63DBD-0FC0-4057-AC92-1717C1D0ED55}"/>
+              </a:ext>
+            </a:extLst>
+          </p:cNvPr>
+          <p:cNvSpPr>
+            <a:spLocks noGrp="1"/>
+          </p:cNvSpPr>
+          <p:nvPr>
+            <p:ph type="subTitle" idx="1"/>
+          </p:nvPr>
+        </p:nvSpPr>
+        <p:spPr>
+          <a:xfrm>
+            <a:off x="2401843" y="3634445"/>
+            <a:ext cx="9144000" cy="2568392"/>
+          </a:xfrm>
+        </p:spPr>
+        <p:txBody>
+          <a:bodyPr>
+            <a:normAutofit fontScale="85000" lnSpcReduction="20000"/>
+          </a:bodyPr>
+          <a:lstStyle/>
+          <a:p>
+            <a:r>
+              <a:rPr lang="en-US" dirty="0"/>
+              <a:t>Bibliography</a:t>
+            </a:r>
+            <a:br>
+              <a:rPr lang="en-US" dirty="0"/>
+            </a:br>
+            <a:r>
+              <a:rPr lang="en-US" sz="1600" dirty="0"/>
+              <a:t>- Lundberg, S. M., &amp; Lee, S. I. (2017). </a:t>
+            </a:r>
+            <a:r>
+              <a:rPr lang="en-US" sz="1600" i="1" dirty="0"/>
+              <a:t>A unified approach to interpreting model predictions</a:t>
+            </a:r>
+            <a:r>
+              <a:rPr lang="en-US" sz="1600" dirty="0"/>
+              <a:t>. Advances in neural information processing systems, 30. [</a:t>
+            </a:r>
+            <a:r>
+              <a:rPr lang="en-US" sz="1600" b="1" dirty="0">
+                <a:solidFill>
+                  <a:srgbClr val="FF0000"/>
+                </a:solidFill>
+              </a:rPr>
+              <a:t>SHAP</a:t>
+            </a:r>
+            <a:r>
+              <a:rPr lang="en-US" sz="1600" dirty="0"/>
+              <a:t>]</a:t>
+            </a:r>
+            <a:br>
+              <a:rPr lang="en-US" sz="1600" dirty="0"/>
+            </a:br>
+            <a:r>
+              <a:rPr lang="en-US" sz="1600" dirty="0"/>
+              <a:t>- Ribeiro, M. T., Singh, S., &amp; </a:t>
+            </a:r>
+            <a:r>
+              <a:rPr lang="en-US" sz="1600" dirty="0" err="1"/>
+              <a:t>Guestrin</a:t>
+            </a:r>
+            <a:r>
+              <a:rPr lang="en-US" sz="1600" dirty="0"/>
+              <a:t>, C. (2016). </a:t>
+            </a:r>
+            <a:r>
+              <a:rPr lang="en-US" sz="1600" i="1" dirty="0"/>
+              <a:t>"Why should I trust you?" Explaining the predictions of any classifier</a:t>
+            </a:r>
+            <a:r>
+              <a:rPr lang="en-US" sz="1600" dirty="0"/>
+              <a:t>. In Proceedings of the 22nd ACM SIGKDD international conference on knowledge discovery and data mining (pp. 1135-1144). [</a:t>
+            </a:r>
+            <a:r>
+              <a:rPr lang="en-US" sz="1600" b="1" dirty="0">
+                <a:solidFill>
+                  <a:srgbClr val="FF0000"/>
+                </a:solidFill>
+              </a:rPr>
+              <a:t>LIME</a:t>
+            </a:r>
+            <a:r>
+              <a:rPr lang="en-US" sz="1600" dirty="0"/>
+              <a:t>]</a:t>
+            </a:r>
+            <a:br>
+              <a:rPr lang="en-US" sz="1600" dirty="0"/>
+            </a:br>
+            <a:r>
+              <a:rPr lang="en-US" sz="1600" dirty="0"/>
+              <a:t>- </a:t>
+            </a:r>
+            <a:r>
+              <a:rPr lang="en-US" sz="1600" dirty="0" err="1"/>
+              <a:t>Selvaraju</a:t>
+            </a:r>
+            <a:r>
+              <a:rPr lang="en-US" sz="1600" dirty="0"/>
+              <a:t>, R. R., Cogswell, M., Das, A., </a:t>
+            </a:r>
+            <a:r>
+              <a:rPr lang="en-US" sz="1600" dirty="0" err="1"/>
+              <a:t>Vedantam</a:t>
+            </a:r>
+            <a:r>
+              <a:rPr lang="en-US" sz="1600" dirty="0"/>
+              <a:t>, R., Parikh, D., &amp; Batra, D. (2017). </a:t>
+            </a:r>
+            <a:r>
+              <a:rPr lang="en-US" sz="1600" i="1" dirty="0"/>
+              <a:t>Grad-cam: Visual explanations from deep networks via gradient-based localization</a:t>
+            </a:r>
+            <a:r>
+              <a:rPr lang="en-US" sz="1600" dirty="0"/>
+              <a:t>. In Proceedings of the IEEE international conference on computer vision (pp. 618-626).</a:t>
+            </a:r>
+            <a:br>
+              <a:rPr lang="en-US" sz="1600" dirty="0"/>
+            </a:br>
+            <a:r>
+              <a:rPr lang="en-US" sz="1600" dirty="0"/>
+              <a:t>- </a:t>
+            </a:r>
+            <a:r>
+              <a:rPr lang="en-US" sz="1600" dirty="0" err="1"/>
+              <a:t>Simonyan</a:t>
+            </a:r>
+            <a:r>
+              <a:rPr lang="en-US" sz="1600" dirty="0"/>
+              <a:t>, K., </a:t>
+            </a:r>
+            <a:r>
+              <a:rPr lang="en-US" sz="1600" dirty="0" err="1"/>
+              <a:t>Vedaldi</a:t>
+            </a:r>
+            <a:r>
+              <a:rPr lang="en-US" sz="1600" dirty="0"/>
+              <a:t>, A., &amp; Zisserman, A. (2013). Deep inside convolutional networks: </a:t>
+            </a:r>
+            <a:r>
+              <a:rPr lang="en-US" sz="1600" dirty="0" err="1"/>
+              <a:t>Visualising</a:t>
+            </a:r>
+            <a:r>
+              <a:rPr lang="en-US" sz="1600" dirty="0"/>
+              <a:t> image classification models and saliency maps. </a:t>
+            </a:r>
+            <a:r>
+              <a:rPr lang="en-US" sz="1600" dirty="0" err="1"/>
+              <a:t>arXiv</a:t>
+            </a:r>
+            <a:r>
+              <a:rPr lang="en-US" sz="1600" dirty="0"/>
+              <a:t> preprint arXiv:1312.6034.</a:t>
+            </a:r>
+            <a:br>
+              <a:rPr lang="en-US" sz="1600" dirty="0"/>
+            </a:br>
+            <a:r>
+              <a:rPr lang="en-US" sz="1600" dirty="0"/>
+              <a:t>- </a:t>
+            </a:r>
+            <a:r>
+              <a:rPr lang="en-US" sz="1600" dirty="0" err="1"/>
+              <a:t>Springenberg</a:t>
+            </a:r>
+            <a:r>
+              <a:rPr lang="en-US" sz="1600" dirty="0"/>
+              <a:t>, J. T., </a:t>
+            </a:r>
+            <a:r>
+              <a:rPr lang="en-US" sz="1600" dirty="0" err="1"/>
+              <a:t>Dosovitskiy</a:t>
+            </a:r>
+            <a:r>
+              <a:rPr lang="en-US" sz="1600" dirty="0"/>
+              <a:t>, A., </a:t>
+            </a:r>
+            <a:r>
+              <a:rPr lang="en-US" sz="1600" dirty="0" err="1"/>
+              <a:t>Brox</a:t>
+            </a:r>
+            <a:r>
+              <a:rPr lang="en-US" sz="1600" dirty="0"/>
+              <a:t>, T., &amp; </a:t>
+            </a:r>
+            <a:r>
+              <a:rPr lang="en-US" sz="1600" dirty="0" err="1"/>
+              <a:t>Riedmiller</a:t>
+            </a:r>
+            <a:r>
+              <a:rPr lang="en-US" sz="1600" dirty="0"/>
+              <a:t>, M. (2014). </a:t>
+            </a:r>
+            <a:r>
+              <a:rPr lang="en-US" sz="1600" i="1" dirty="0"/>
+              <a:t>Striving for simplicity: The all convolutional net</a:t>
+            </a:r>
+            <a:r>
+              <a:rPr lang="en-US" sz="1600" dirty="0"/>
+              <a:t>. </a:t>
+            </a:r>
+            <a:r>
+              <a:rPr lang="en-US" sz="1600" dirty="0" err="1"/>
+              <a:t>arXiv</a:t>
+            </a:r>
+            <a:r>
+              <a:rPr lang="en-US" sz="1600" dirty="0"/>
+              <a:t> preprint arXiv:1412.6806. [</a:t>
+            </a:r>
+            <a:r>
+              <a:rPr lang="en-US" sz="1600" b="1" dirty="0">
+                <a:solidFill>
+                  <a:srgbClr val="FF0000"/>
+                </a:solidFill>
+              </a:rPr>
+              <a:t>Visualizing Feature Patterns</a:t>
+            </a:r>
+            <a:r>
+              <a:rPr lang="en-US" sz="1600" dirty="0"/>
+              <a:t>]</a:t>
+            </a:r>
+          </a:p>
+          <a:p>
+            <a:r>
+              <a:rPr lang="en-US" sz="1400" dirty="0"/>
+              <a:t>Images and videos: unless otherwise stated, I stole them from the Internet. I hope they are not copyrighted, or that their use falls under the Fair Use clause, and if not, I am sorry. Please don’t sue me.</a:t>
+            </a:r>
+          </a:p>
+        </p:txBody>
+      </p:sp>
+      <p:pic>
+        <p:nvPicPr>
+          <p:cNvPr id="6" name="Picture 2">
+            <a:extLst>
+              <a:ext uri="{FF2B5EF4-FFF2-40B4-BE49-F238E27FC236}">
+                <a16:creationId xmlns:a16="http://schemas.microsoft.com/office/drawing/2014/main" id="{6E214693-AB7E-4C54-8D7C-0391735F7C4F}"/>
+              </a:ext>
+            </a:extLst>
+          </p:cNvPr>
+          <p:cNvPicPr>
+            <a:picLocks noChangeAspect="1" noChangeArrowheads="1"/>
+          </p:cNvPicPr>
+          <p:nvPr/>
+        </p:nvPicPr>
+        <p:blipFill rotWithShape="1">
+          <a:blip r:embed="rId2" cstate="print">
+            <a:extLst>
+              <a:ext uri="{BEBA8EAE-BF5A-486C-A8C5-ECC9F3942E4B}">
+                <a14:imgProps xmlns:a14="http://schemas.microsoft.com/office/drawing/2010/main">
+                  <a14:imgLayer r:embed="rId3">
+                    <a14:imgEffect>
+                      <a14:backgroundRemoval t="22283" b="75673" l="54554" r="90983"/>
+                    </a14:imgEffect>
+                  </a14:imgLayer>
+                </a14:imgProps>
+              </a:ext>
+              <a:ext uri="{28A0092B-C50C-407E-A947-70E740481C1C}">
+                <a14:useLocalDpi xmlns:a14="http://schemas.microsoft.com/office/drawing/2010/main" val="0"/>
+              </a:ext>
+            </a:extLst>
+          </a:blip>
+          <a:srcRect l="50000" t="15610" r="4463" b="17653"/>
+          <a:stretch/>
+        </p:blipFill>
+        <p:spPr bwMode="auto">
+          <a:xfrm>
+            <a:off x="4938382" y="1037974"/>
+            <a:ext cx="1295445" cy="884352"/>
+          </a:xfrm>
+          <a:prstGeom prst="rect">
+            <a:avLst/>
+          </a:prstGeom>
+          <a:noFill/>
+          <a:extLst>
+            <a:ext uri="{909E8E84-426E-40DD-AFC4-6F175D3DCCD1}">
+              <a14:hiddenFill xmlns:a14="http://schemas.microsoft.com/office/drawing/2010/main">
+                <a:solidFill>
+                  <a:srgbClr val="FFFFFF"/>
+                </a:solidFill>
+              </a14:hiddenFill>
+            </a:ext>
+          </a:extLst>
+        </p:spPr>
+      </p:pic>
+      <p:pic>
+        <p:nvPicPr>
+          <p:cNvPr id="7" name="Image 6">
+            <a:extLst>
+              <a:ext uri="{FF2B5EF4-FFF2-40B4-BE49-F238E27FC236}">
+                <a16:creationId xmlns:a16="http://schemas.microsoft.com/office/drawing/2014/main" id="{414D43F9-35B6-46FA-B5D4-8F2F1AA72ED1}"/>
+              </a:ext>
+            </a:extLst>
+          </p:cNvPr>
+          <p:cNvPicPr>
+            <a:picLocks noChangeAspect="1"/>
+          </p:cNvPicPr>
+          <p:nvPr/>
+        </p:nvPicPr>
+        <p:blipFill>
+          <a:blip r:embed="rId4">
+            <a:extLst>
+              <a:ext uri="{28A0092B-C50C-407E-A947-70E740481C1C}">
+                <a14:useLocalDpi xmlns:a14="http://schemas.microsoft.com/office/drawing/2010/main" val="0"/>
+              </a:ext>
+            </a:extLst>
+          </a:blip>
+          <a:stretch>
+            <a:fillRect/>
+          </a:stretch>
+        </p:blipFill>
+        <p:spPr>
+          <a:xfrm>
+            <a:off x="6383826" y="1073027"/>
+            <a:ext cx="1642424" cy="574848"/>
+          </a:xfrm>
+          <a:prstGeom prst="rect">
+            <a:avLst/>
+          </a:prstGeom>
+        </p:spPr>
+      </p:pic>
+    </p:spTree>
+    <p:extLst>
+      <p:ext uri="{BB962C8B-B14F-4D97-AF65-F5344CB8AC3E}">
+        <p14:creationId xmlns:p14="http://schemas.microsoft.com/office/powerpoint/2010/main" val="938009228"/>
+      </p:ext>
+    </p:extLst>
+  </p:cSld>
+  <p:clrMapOvr>
+    <a:masterClrMapping/>
+  </p:clrMapOvr>
+</p:sld>
+</file>
+
 <file path=ppt/slides/slide2.xml><?xml version="1.0" encoding="utf-8"?>
 <p:sld xmlns:a="http://schemas.openxmlformats.org/drawingml/2006/main" xmlns:r="http://schemas.openxmlformats.org/officeDocument/2006/relationships" xmlns:p="http://schemas.openxmlformats.org/presentationml/2006/main">
   <p:cSld>
@@ -2074,7 +2615,7 @@
           <a:p>
             <a:r>
               <a:rPr lang="en-US" dirty="0"/>
-              <a:t>Black-box effect is even worse for CNNs</a:t>
+              <a:t>Black-box effect</a:t>
             </a:r>
           </a:p>
         </p:txBody>
@@ -2102,13 +2643,51 @@
           <a:p>
             <a:r>
               <a:rPr lang="en-US" dirty="0"/>
-              <a:t>Feature construction step</a:t>
-            </a:r>
-          </a:p>
-          <a:p>
-            <a:r>
-              <a:rPr lang="en-US" dirty="0"/>
-              <a:t>What are the features used?</a:t>
+              <a:t>Black-box effect is common to all ML algorithms</a:t>
+            </a:r>
+          </a:p>
+          <a:p>
+            <a:pPr lvl="1"/>
+            <a:r>
+              <a:rPr lang="en-US" dirty="0"/>
+              <a:t>We know that the prediction is, but not why the model did it</a:t>
+            </a:r>
+          </a:p>
+          <a:p>
+            <a:pPr lvl="1"/>
+            <a:r>
+              <a:rPr lang="en-US" dirty="0"/>
+              <a:t>Too many parameters to analyze, even for RF or big Decision Trees</a:t>
+            </a:r>
+          </a:p>
+          <a:p>
+            <a:endParaRPr lang="en-US" dirty="0"/>
+          </a:p>
+          <a:p>
+            <a:r>
+              <a:rPr lang="en-US" dirty="0"/>
+              <a:t>For CNNs, it’s even worse</a:t>
+            </a:r>
+          </a:p>
+          <a:p>
+            <a:pPr lvl="1"/>
+            <a:r>
+              <a:rPr lang="en-US" dirty="0"/>
+              <a:t>Feature construction/extraction step</a:t>
+            </a:r>
+          </a:p>
+          <a:p>
+            <a:pPr lvl="1"/>
+            <a:r>
+              <a:rPr lang="en-US" dirty="0"/>
+              <a:t>What are the features used? What do they look like?</a:t>
+            </a:r>
+          </a:p>
+          <a:p>
+            <a:pPr lvl="1"/>
+            <a:r>
+              <a:rPr lang="en-US" dirty="0"/>
+              <a:t>What parts of the images is the CNN analyzing to give a decision?</a:t>
             </a:r>
           </a:p>
         </p:txBody>
@@ -2299,6 +2878,53 @@
           </a:p>
         </p:txBody>
       </p:sp>
+      <p:sp>
+        <p:nvSpPr>
+          <p:cNvPr id="4" name="Rectangle 3">
+            <a:extLst>
+              <a:ext uri="{FF2B5EF4-FFF2-40B4-BE49-F238E27FC236}">
+                <a16:creationId xmlns:a16="http://schemas.microsoft.com/office/drawing/2014/main" id="{08F3746D-8E1A-4210-8EC5-B6AFC2E6F87A}"/>
+              </a:ext>
+            </a:extLst>
+          </p:cNvPr>
+          <p:cNvSpPr/>
+          <p:nvPr/>
+        </p:nvSpPr>
+        <p:spPr>
+          <a:xfrm>
+            <a:off x="4340258" y="5707962"/>
+            <a:ext cx="7013542" cy="782425"/>
+          </a:xfrm>
+          <a:prstGeom prst="rect">
+            <a:avLst/>
+          </a:prstGeom>
+        </p:spPr>
+        <p:style>
+          <a:lnRef idx="2">
+            <a:schemeClr val="dk1"/>
+          </a:lnRef>
+          <a:fillRef idx="1">
+            <a:schemeClr val="lt1"/>
+          </a:fillRef>
+          <a:effectRef idx="0">
+            <a:schemeClr val="dk1"/>
+          </a:effectRef>
+          <a:fontRef idx="minor">
+            <a:schemeClr val="dk1"/>
+          </a:fontRef>
+        </p:style>
+        <p:txBody>
+          <a:bodyPr rtlCol="0" anchor="ctr"/>
+          <a:lstStyle/>
+          <a:p>
+            <a:pPr algn="ctr"/>
+            <a:r>
+              <a:rPr lang="en-US" dirty="0"/>
+              <a:t>*…this is a long discussion. The short version is that there seems to be a trade-off between interpretability and performance</a:t>
+            </a:r>
+          </a:p>
+        </p:txBody>
+      </p:sp>
     </p:spTree>
     <p:extLst>
       <p:ext uri="{BB962C8B-B14F-4D97-AF65-F5344CB8AC3E}">
@@ -2399,14 +3025,26 @@
             <a:pPr lvl="1"/>
             <a:r>
               <a:rPr lang="en-US" dirty="0"/>
-              <a:t>LIME</a:t>
+              <a:t>Local Interpretable Model-agnostic Explanations (LIME)</a:t>
             </a:r>
           </a:p>
           <a:p>
             <a:pPr lvl="1"/>
             <a:r>
-              <a:rPr lang="en-US" dirty="0"/>
-              <a:t>SHAP/SHAPLY</a:t>
+              <a:rPr lang="en-US" dirty="0" err="1"/>
+              <a:t>SHapley</a:t>
+            </a:r>
+            <a:r>
+              <a:rPr lang="en-US" dirty="0"/>
+              <a:t> Additive </a:t>
+            </a:r>
+            <a:r>
+              <a:rPr lang="en-US" dirty="0" err="1"/>
+              <a:t>exPlanations</a:t>
+            </a:r>
+            <a:r>
+              <a:rPr lang="en-US" dirty="0"/>
+              <a:t> (SHAP/SHAPLY)</a:t>
             </a:r>
           </a:p>
           <a:p>
@@ -2608,7 +3246,7 @@
           <p:cNvPr id="2" name="Titre 1">
             <a:extLst>
               <a:ext uri="{FF2B5EF4-FFF2-40B4-BE49-F238E27FC236}">
-                <a16:creationId xmlns:a16="http://schemas.microsoft.com/office/drawing/2014/main" id="{D02228F8-2E9C-4B7B-AAC0-587F1402131E}"/>
+                <a16:creationId xmlns:a16="http://schemas.microsoft.com/office/drawing/2014/main" id="{ABB448C6-E53D-47E5-AE4F-33FF6E835D83}"/>
               </a:ext>
             </a:extLst>
           </p:cNvPr>
@@ -2626,7 +3264,7 @@
           <a:p>
             <a:r>
               <a:rPr lang="en-US" dirty="0"/>
-              <a:t>Saliency maps</a:t>
+              <a:t>Visualization of feature patterns</a:t>
             </a:r>
           </a:p>
         </p:txBody>
@@ -2636,7 +3274,7 @@
           <p:cNvPr id="3" name="Espace réservé du texte 2">
             <a:extLst>
               <a:ext uri="{FF2B5EF4-FFF2-40B4-BE49-F238E27FC236}">
-                <a16:creationId xmlns:a16="http://schemas.microsoft.com/office/drawing/2014/main" id="{AE11C3D2-6F27-4683-9631-859809B0DB72}"/>
+                <a16:creationId xmlns:a16="http://schemas.microsoft.com/office/drawing/2014/main" id="{9DE34A11-A934-4036-856C-A1072862230D}"/>
               </a:ext>
             </a:extLst>
           </p:cNvPr>
@@ -2652,14 +3290,466 @@
           <a:bodyPr/>
           <a:lstStyle/>
           <a:p>
-            <a:endParaRPr lang="en-US"/>
+            <a:r>
+              <a:rPr lang="en-US" dirty="0"/>
+              <a:t>Optimize an </a:t>
+            </a:r>
+            <a:r>
+              <a:rPr lang="en-US" i="1" dirty="0"/>
+              <a:t>image</a:t>
+            </a:r>
+          </a:p>
+          <a:p>
+            <a:pPr lvl="1"/>
+            <a:r>
+              <a:rPr lang="en-US" dirty="0"/>
+              <a:t>Treat pixel values as variables in the optimization problem</a:t>
+            </a:r>
+          </a:p>
+          <a:p>
+            <a:pPr lvl="1"/>
+            <a:r>
+              <a:rPr lang="en-US" dirty="0"/>
+              <a:t>Generate image that </a:t>
+            </a:r>
+            <a:r>
+              <a:rPr lang="en-US" i="1" dirty="0"/>
+              <a:t>maximizes</a:t>
+            </a:r>
+            <a:r>
+              <a:rPr lang="en-US" dirty="0"/>
+              <a:t> output of a target filter</a:t>
+            </a:r>
+          </a:p>
+          <a:p>
+            <a:pPr lvl="1"/>
+            <a:r>
+              <a:rPr lang="en-US" dirty="0"/>
+              <a:t>Backpropagating gradients to the </a:t>
+            </a:r>
+            <a:r>
+              <a:rPr lang="en-US" i="1" dirty="0"/>
+              <a:t>pixels</a:t>
+            </a:r>
           </a:p>
         </p:txBody>
       </p:sp>
+      <p:pic>
+        <p:nvPicPr>
+          <p:cNvPr id="4" name="Image 3">
+            <a:extLst>
+              <a:ext uri="{FF2B5EF4-FFF2-40B4-BE49-F238E27FC236}">
+                <a16:creationId xmlns:a16="http://schemas.microsoft.com/office/drawing/2014/main" id="{88DC0455-AF05-4F15-861F-DB755C8899A4}"/>
+              </a:ext>
+            </a:extLst>
+          </p:cNvPr>
+          <p:cNvPicPr>
+            <a:picLocks noChangeAspect="1"/>
+          </p:cNvPicPr>
+          <p:nvPr/>
+        </p:nvPicPr>
+        <p:blipFill>
+          <a:blip r:embed="rId2">
+            <a:extLst>
+              <a:ext uri="{28A0092B-C50C-407E-A947-70E740481C1C}">
+                <a14:useLocalDpi xmlns:a14="http://schemas.microsoft.com/office/drawing/2010/main" val="0"/>
+              </a:ext>
+            </a:extLst>
+          </a:blip>
+          <a:stretch>
+            <a:fillRect/>
+          </a:stretch>
+        </p:blipFill>
+        <p:spPr>
+          <a:xfrm>
+            <a:off x="7220932" y="3614475"/>
+            <a:ext cx="4132868" cy="2484700"/>
+          </a:xfrm>
+          <a:prstGeom prst="rect">
+            <a:avLst/>
+          </a:prstGeom>
+        </p:spPr>
+      </p:pic>
+      <p:sp>
+        <p:nvSpPr>
+          <p:cNvPr id="5" name="Ellipse 4">
+            <a:extLst>
+              <a:ext uri="{FF2B5EF4-FFF2-40B4-BE49-F238E27FC236}">
+                <a16:creationId xmlns:a16="http://schemas.microsoft.com/office/drawing/2014/main" id="{19D502C2-70DC-4BB1-AC07-4FF18099FDA8}"/>
+              </a:ext>
+            </a:extLst>
+          </p:cNvPr>
+          <p:cNvSpPr/>
+          <p:nvPr/>
+        </p:nvSpPr>
+        <p:spPr>
+          <a:xfrm>
+            <a:off x="7117238" y="4326903"/>
+            <a:ext cx="1593130" cy="1621410"/>
+          </a:xfrm>
+          <a:prstGeom prst="ellipse">
+            <a:avLst/>
+          </a:prstGeom>
+          <a:noFill/>
+          <a:ln w="57150">
+            <a:solidFill>
+              <a:srgbClr val="FF0000"/>
+            </a:solidFill>
+          </a:ln>
+        </p:spPr>
+        <p:style>
+          <a:lnRef idx="2">
+            <a:schemeClr val="accent1">
+              <a:shade val="50000"/>
+            </a:schemeClr>
+          </a:lnRef>
+          <a:fillRef idx="1">
+            <a:schemeClr val="accent1"/>
+          </a:fillRef>
+          <a:effectRef idx="0">
+            <a:schemeClr val="accent1"/>
+          </a:effectRef>
+          <a:fontRef idx="minor">
+            <a:schemeClr val="lt1"/>
+          </a:fontRef>
+        </p:style>
+        <p:txBody>
+          <a:bodyPr rtlCol="0" anchor="ctr"/>
+          <a:lstStyle/>
+          <a:p>
+            <a:pPr algn="ctr"/>
+            <a:endParaRPr lang="en-US"/>
+          </a:p>
+        </p:txBody>
+      </p:sp>
+      <p:sp>
+        <p:nvSpPr>
+          <p:cNvPr id="6" name="Rectangle 5">
+            <a:extLst>
+              <a:ext uri="{FF2B5EF4-FFF2-40B4-BE49-F238E27FC236}">
+                <a16:creationId xmlns:a16="http://schemas.microsoft.com/office/drawing/2014/main" id="{B8E40AFD-61C7-4847-998C-6D6FC000E2B0}"/>
+              </a:ext>
+            </a:extLst>
+          </p:cNvPr>
+          <p:cNvSpPr/>
+          <p:nvPr/>
+        </p:nvSpPr>
+        <p:spPr>
+          <a:xfrm>
+            <a:off x="8710368" y="2912882"/>
+            <a:ext cx="2102176" cy="603316"/>
+          </a:xfrm>
+          <a:prstGeom prst="rect">
+            <a:avLst/>
+          </a:prstGeom>
+          <a:solidFill>
+            <a:schemeClr val="bg1"/>
+          </a:solidFill>
+          <a:ln w="38100">
+            <a:solidFill>
+              <a:srgbClr val="FF0000"/>
+            </a:solidFill>
+          </a:ln>
+        </p:spPr>
+        <p:style>
+          <a:lnRef idx="2">
+            <a:schemeClr val="accent1">
+              <a:shade val="50000"/>
+            </a:schemeClr>
+          </a:lnRef>
+          <a:fillRef idx="1">
+            <a:schemeClr val="accent1"/>
+          </a:fillRef>
+          <a:effectRef idx="0">
+            <a:schemeClr val="accent1"/>
+          </a:effectRef>
+          <a:fontRef idx="minor">
+            <a:schemeClr val="lt1"/>
+          </a:fontRef>
+        </p:style>
+        <p:txBody>
+          <a:bodyPr rtlCol="0" anchor="ctr"/>
+          <a:lstStyle/>
+          <a:p>
+            <a:pPr algn="ctr"/>
+            <a:r>
+              <a:rPr lang="en-US" sz="2800" dirty="0">
+                <a:solidFill>
+                  <a:schemeClr val="tx1"/>
+                </a:solidFill>
+              </a:rPr>
+              <a:t>Zoomed in</a:t>
+            </a:r>
+          </a:p>
+        </p:txBody>
+      </p:sp>
+      <p:cxnSp>
+        <p:nvCxnSpPr>
+          <p:cNvPr id="8" name="Connecteur droit 7">
+            <a:extLst>
+              <a:ext uri="{FF2B5EF4-FFF2-40B4-BE49-F238E27FC236}">
+                <a16:creationId xmlns:a16="http://schemas.microsoft.com/office/drawing/2014/main" id="{9CBC6FF7-0BDD-4377-AD6F-F4A41B0C3FBC}"/>
+              </a:ext>
+            </a:extLst>
+          </p:cNvPr>
+          <p:cNvCxnSpPr>
+            <a:stCxn id="6" idx="2"/>
+            <a:endCxn id="5" idx="7"/>
+          </p:cNvCxnSpPr>
+          <p:nvPr/>
+        </p:nvCxnSpPr>
+        <p:spPr>
+          <a:xfrm flipH="1">
+            <a:off x="8477060" y="3516198"/>
+            <a:ext cx="1284396" cy="1048155"/>
+          </a:xfrm>
+          <a:prstGeom prst="line">
+            <a:avLst/>
+          </a:prstGeom>
+          <a:noFill/>
+          <a:ln w="57150">
+            <a:solidFill>
+              <a:srgbClr val="FF0000"/>
+            </a:solidFill>
+          </a:ln>
+        </p:spPr>
+        <p:style>
+          <a:lnRef idx="2">
+            <a:schemeClr val="accent1">
+              <a:shade val="50000"/>
+            </a:schemeClr>
+          </a:lnRef>
+          <a:fillRef idx="1">
+            <a:schemeClr val="accent1"/>
+          </a:fillRef>
+          <a:effectRef idx="0">
+            <a:schemeClr val="accent1"/>
+          </a:effectRef>
+          <a:fontRef idx="minor">
+            <a:schemeClr val="lt1"/>
+          </a:fontRef>
+        </p:style>
+      </p:cxnSp>
+      <p:pic>
+        <p:nvPicPr>
+          <p:cNvPr id="10" name="Image 9">
+            <a:extLst>
+              <a:ext uri="{FF2B5EF4-FFF2-40B4-BE49-F238E27FC236}">
+                <a16:creationId xmlns:a16="http://schemas.microsoft.com/office/drawing/2014/main" id="{E4EB6DE4-956C-4269-BF82-B8AB1178AC7D}"/>
+              </a:ext>
+            </a:extLst>
+          </p:cNvPr>
+          <p:cNvPicPr>
+            <a:picLocks noChangeAspect="1"/>
+          </p:cNvPicPr>
+          <p:nvPr/>
+        </p:nvPicPr>
+        <p:blipFill>
+          <a:blip r:embed="rId3">
+            <a:extLst>
+              <a:ext uri="{28A0092B-C50C-407E-A947-70E740481C1C}">
+                <a14:useLocalDpi xmlns:a14="http://schemas.microsoft.com/office/drawing/2010/main" val="0"/>
+              </a:ext>
+            </a:extLst>
+          </a:blip>
+          <a:stretch>
+            <a:fillRect/>
+          </a:stretch>
+        </p:blipFill>
+        <p:spPr>
+          <a:xfrm>
+            <a:off x="262579" y="3814713"/>
+            <a:ext cx="2133600" cy="2133600"/>
+          </a:xfrm>
+          <a:prstGeom prst="rect">
+            <a:avLst/>
+          </a:prstGeom>
+        </p:spPr>
+      </p:pic>
+      <p:pic>
+        <p:nvPicPr>
+          <p:cNvPr id="12" name="Image 11">
+            <a:extLst>
+              <a:ext uri="{FF2B5EF4-FFF2-40B4-BE49-F238E27FC236}">
+                <a16:creationId xmlns:a16="http://schemas.microsoft.com/office/drawing/2014/main" id="{D2474318-1793-47DC-8471-26312CB3797D}"/>
+              </a:ext>
+            </a:extLst>
+          </p:cNvPr>
+          <p:cNvPicPr>
+            <a:picLocks noChangeAspect="1"/>
+          </p:cNvPicPr>
+          <p:nvPr/>
+        </p:nvPicPr>
+        <p:blipFill>
+          <a:blip r:embed="rId4">
+            <a:extLst>
+              <a:ext uri="{28A0092B-C50C-407E-A947-70E740481C1C}">
+                <a14:useLocalDpi xmlns:a14="http://schemas.microsoft.com/office/drawing/2010/main" val="0"/>
+              </a:ext>
+            </a:extLst>
+          </a:blip>
+          <a:stretch>
+            <a:fillRect/>
+          </a:stretch>
+        </p:blipFill>
+        <p:spPr>
+          <a:xfrm>
+            <a:off x="2535616" y="3814713"/>
+            <a:ext cx="2133600" cy="2133600"/>
+          </a:xfrm>
+          <a:prstGeom prst="rect">
+            <a:avLst/>
+          </a:prstGeom>
+        </p:spPr>
+      </p:pic>
+      <p:pic>
+        <p:nvPicPr>
+          <p:cNvPr id="14" name="Image 13">
+            <a:extLst>
+              <a:ext uri="{FF2B5EF4-FFF2-40B4-BE49-F238E27FC236}">
+                <a16:creationId xmlns:a16="http://schemas.microsoft.com/office/drawing/2014/main" id="{78A271C6-AFF5-4460-8095-26D8435A98E7}"/>
+              </a:ext>
+            </a:extLst>
+          </p:cNvPr>
+          <p:cNvPicPr>
+            <a:picLocks noChangeAspect="1"/>
+          </p:cNvPicPr>
+          <p:nvPr/>
+        </p:nvPicPr>
+        <p:blipFill>
+          <a:blip r:embed="rId5">
+            <a:extLst>
+              <a:ext uri="{28A0092B-C50C-407E-A947-70E740481C1C}">
+                <a14:useLocalDpi xmlns:a14="http://schemas.microsoft.com/office/drawing/2010/main" val="0"/>
+              </a:ext>
+            </a:extLst>
+          </a:blip>
+          <a:stretch>
+            <a:fillRect/>
+          </a:stretch>
+        </p:blipFill>
+        <p:spPr>
+          <a:xfrm>
+            <a:off x="4822401" y="3814713"/>
+            <a:ext cx="2133600" cy="2133600"/>
+          </a:xfrm>
+          <a:prstGeom prst="rect">
+            <a:avLst/>
+          </a:prstGeom>
+        </p:spPr>
+      </p:pic>
+      <p:sp>
+        <p:nvSpPr>
+          <p:cNvPr id="15" name="Rectangle 14">
+            <a:extLst>
+              <a:ext uri="{FF2B5EF4-FFF2-40B4-BE49-F238E27FC236}">
+                <a16:creationId xmlns:a16="http://schemas.microsoft.com/office/drawing/2014/main" id="{5DCFA954-A992-4FC1-90C9-22A84070C61C}"/>
+              </a:ext>
+            </a:extLst>
+          </p:cNvPr>
+          <p:cNvSpPr/>
+          <p:nvPr/>
+        </p:nvSpPr>
+        <p:spPr>
+          <a:xfrm>
+            <a:off x="9287366" y="5797517"/>
+            <a:ext cx="2102176" cy="603316"/>
+          </a:xfrm>
+          <a:prstGeom prst="rect">
+            <a:avLst/>
+          </a:prstGeom>
+          <a:solidFill>
+            <a:schemeClr val="bg1"/>
+          </a:solidFill>
+          <a:ln w="38100">
+            <a:solidFill>
+              <a:srgbClr val="FF0000"/>
+            </a:solidFill>
+          </a:ln>
+        </p:spPr>
+        <p:style>
+          <a:lnRef idx="2">
+            <a:schemeClr val="accent1">
+              <a:shade val="50000"/>
+            </a:schemeClr>
+          </a:lnRef>
+          <a:fillRef idx="1">
+            <a:schemeClr val="accent1"/>
+          </a:fillRef>
+          <a:effectRef idx="0">
+            <a:schemeClr val="accent1"/>
+          </a:effectRef>
+          <a:fontRef idx="minor">
+            <a:schemeClr val="lt1"/>
+          </a:fontRef>
+        </p:style>
+        <p:txBody>
+          <a:bodyPr rtlCol="0" anchor="ctr"/>
+          <a:lstStyle/>
+          <a:p>
+            <a:pPr algn="ctr"/>
+            <a:r>
+              <a:rPr lang="en-US" sz="1600" dirty="0">
+                <a:solidFill>
+                  <a:schemeClr val="tx1"/>
+                </a:solidFill>
+              </a:rPr>
+              <a:t>Or maybe guided backpropagation…?</a:t>
+            </a:r>
+          </a:p>
+        </p:txBody>
+      </p:sp>
+      <p:cxnSp>
+        <p:nvCxnSpPr>
+          <p:cNvPr id="17" name="Connecteur droit 16">
+            <a:extLst>
+              <a:ext uri="{FF2B5EF4-FFF2-40B4-BE49-F238E27FC236}">
+                <a16:creationId xmlns:a16="http://schemas.microsoft.com/office/drawing/2014/main" id="{48A533DE-B2AF-46FD-88FD-6CAE1313DC8C}"/>
+              </a:ext>
+            </a:extLst>
+          </p:cNvPr>
+          <p:cNvCxnSpPr>
+            <a:stCxn id="15" idx="1"/>
+            <a:endCxn id="5" idx="5"/>
+          </p:cNvCxnSpPr>
+          <p:nvPr/>
+        </p:nvCxnSpPr>
+        <p:spPr>
+          <a:xfrm flipH="1" flipV="1">
+            <a:off x="8477060" y="5710863"/>
+            <a:ext cx="810306" cy="388312"/>
+          </a:xfrm>
+          <a:prstGeom prst="line">
+            <a:avLst/>
+          </a:prstGeom>
+          <a:noFill/>
+          <a:ln w="57150">
+            <a:solidFill>
+              <a:srgbClr val="FF0000"/>
+            </a:solidFill>
+          </a:ln>
+        </p:spPr>
+        <p:style>
+          <a:lnRef idx="2">
+            <a:schemeClr val="accent1">
+              <a:shade val="50000"/>
+            </a:schemeClr>
+          </a:lnRef>
+          <a:fillRef idx="1">
+            <a:schemeClr val="accent1"/>
+          </a:fillRef>
+          <a:effectRef idx="0">
+            <a:schemeClr val="accent1"/>
+          </a:effectRef>
+          <a:fontRef idx="minor">
+            <a:schemeClr val="lt1"/>
+          </a:fontRef>
+        </p:style>
+      </p:cxnSp>
     </p:spTree>
     <p:extLst>
       <p:ext uri="{BB962C8B-B14F-4D97-AF65-F5344CB8AC3E}">
-        <p14:creationId xmlns:p14="http://schemas.microsoft.com/office/powerpoint/2010/main" val="1702120084"/>
+        <p14:creationId xmlns:p14="http://schemas.microsoft.com/office/powerpoint/2010/main" val="1390073065"/>
       </p:ext>
     </p:extLst>
   </p:cSld>
@@ -2691,7 +3781,7 @@
           <p:cNvPr id="2" name="Titre 1">
             <a:extLst>
               <a:ext uri="{FF2B5EF4-FFF2-40B4-BE49-F238E27FC236}">
-                <a16:creationId xmlns:a16="http://schemas.microsoft.com/office/drawing/2014/main" id="{535FA191-EEBA-4AD2-A28A-BB9C1CBDC983}"/>
+                <a16:creationId xmlns:a16="http://schemas.microsoft.com/office/drawing/2014/main" id="{FDA826A1-74C9-4FAF-8ADF-A94C70E39465}"/>
               </a:ext>
             </a:extLst>
           </p:cNvPr>
@@ -2708,8 +3798,8 @@
           <a:lstStyle/>
           <a:p>
             <a:r>
-              <a:rPr lang="en-US"/>
-              <a:t>Grad-CAM</a:t>
+              <a:rPr lang="en-US" dirty="0"/>
+              <a:t>Hooks?</a:t>
             </a:r>
           </a:p>
         </p:txBody>
@@ -2719,7 +3809,7 @@
           <p:cNvPr id="3" name="Espace réservé du texte 2">
             <a:extLst>
               <a:ext uri="{FF2B5EF4-FFF2-40B4-BE49-F238E27FC236}">
-                <a16:creationId xmlns:a16="http://schemas.microsoft.com/office/drawing/2014/main" id="{46E916FF-1CBD-4F4B-B2A6-B9A34431BA76}"/>
+                <a16:creationId xmlns:a16="http://schemas.microsoft.com/office/drawing/2014/main" id="{850F4FE8-24F8-4253-B4ED-4DDF99CC8361}"/>
               </a:ext>
             </a:extLst>
           </p:cNvPr>
@@ -2732,17 +3822,150 @@
         </p:nvSpPr>
         <p:spPr/>
         <p:txBody>
-          <a:bodyPr/>
+          <a:bodyPr>
+            <a:normAutofit/>
+          </a:bodyPr>
           <a:lstStyle/>
           <a:p>
-            <a:endParaRPr lang="en-US"/>
+            <a:r>
+              <a:rPr lang="en-US" dirty="0"/>
+              <a:t>The implementation uses </a:t>
+            </a:r>
+            <a:r>
+              <a:rPr lang="en-US" b="1" dirty="0" err="1"/>
+              <a:t>pytorch</a:t>
+            </a:r>
+            <a:r>
+              <a:rPr lang="en-US" b="1" dirty="0"/>
+              <a:t> hooks</a:t>
+            </a:r>
+          </a:p>
+          <a:p>
+            <a:pPr lvl="1"/>
+            <a:r>
+              <a:rPr lang="en-US" dirty="0"/>
+              <a:t>Not very well documented</a:t>
+            </a:r>
+          </a:p>
+          <a:p>
+            <a:pPr lvl="1"/>
+            <a:r>
+              <a:rPr lang="en-US" dirty="0"/>
+              <a:t>Essentially, connect a function to a module or tensor</a:t>
+            </a:r>
+          </a:p>
+          <a:p>
+            <a:pPr lvl="1"/>
+            <a:r>
+              <a:rPr lang="en-US" dirty="0"/>
+              <a:t>Every time outputs (</a:t>
+            </a:r>
+            <a:r>
+              <a:rPr lang="en-US" b="1" dirty="0"/>
+              <a:t>forward</a:t>
+            </a:r>
+            <a:r>
+              <a:rPr lang="en-US" dirty="0"/>
+              <a:t>)…</a:t>
+            </a:r>
+          </a:p>
+          <a:p>
+            <a:pPr lvl="1"/>
+            <a:r>
+              <a:rPr lang="en-US" dirty="0"/>
+              <a:t>Every time computes gradient (</a:t>
+            </a:r>
+            <a:r>
+              <a:rPr lang="en-US" b="1" dirty="0"/>
+              <a:t>backward</a:t>
+            </a:r>
+            <a:r>
+              <a:rPr lang="en-US" dirty="0"/>
+              <a:t>)…</a:t>
+            </a:r>
+          </a:p>
+          <a:p>
+            <a:pPr lvl="1"/>
+            <a:r>
+              <a:rPr lang="en-US" dirty="0"/>
+              <a:t>…the function is invoked!</a:t>
+            </a:r>
+          </a:p>
+          <a:p>
+            <a:r>
+              <a:rPr lang="en-US" dirty="0"/>
+              <a:t>Useful for debugging or visualization</a:t>
+            </a:r>
+          </a:p>
+          <a:p>
+            <a:pPr lvl="1"/>
+            <a:r>
+              <a:rPr lang="en-US" dirty="0"/>
+              <a:t>Without having to tweak with model</a:t>
+            </a:r>
+          </a:p>
+          <a:p>
+            <a:pPr lvl="1"/>
+            <a:r>
+              <a:rPr lang="en-US" dirty="0"/>
+              <a:t>E.g. without writing extra methods</a:t>
+            </a:r>
+          </a:p>
+          <a:p>
+            <a:pPr lvl="1"/>
+            <a:endParaRPr lang="en-US" dirty="0"/>
           </a:p>
         </p:txBody>
       </p:sp>
+      <p:pic>
+        <p:nvPicPr>
+          <p:cNvPr id="1026" name="Picture 2" descr="Avast! … Captain Hook | Bibliotheca Somniare Corvus">
+            <a:extLst>
+              <a:ext uri="{FF2B5EF4-FFF2-40B4-BE49-F238E27FC236}">
+                <a16:creationId xmlns:a16="http://schemas.microsoft.com/office/drawing/2014/main" id="{78A31819-760B-4E2C-A75C-AC85885AD73C}"/>
+              </a:ext>
+            </a:extLst>
+          </p:cNvPr>
+          <p:cNvPicPr>
+            <a:picLocks noChangeAspect="1" noChangeArrowheads="1"/>
+          </p:cNvPicPr>
+          <p:nvPr/>
+        </p:nvPicPr>
+        <p:blipFill rotWithShape="1">
+          <a:blip r:embed="rId2" cstate="print">
+            <a:extLst>
+              <a:ext uri="{28A0092B-C50C-407E-A947-70E740481C1C}">
+                <a14:useLocalDpi xmlns:a14="http://schemas.microsoft.com/office/drawing/2010/main" val="0"/>
+              </a:ext>
+            </a:extLst>
+          </a:blip>
+          <a:srcRect l="10319" r="17918"/>
+          <a:stretch/>
+        </p:blipFill>
+        <p:spPr bwMode="auto">
+          <a:xfrm>
+            <a:off x="8785783" y="2850583"/>
+            <a:ext cx="3289954" cy="3438372"/>
+          </a:xfrm>
+          <a:prstGeom prst="rect">
+            <a:avLst/>
+          </a:prstGeom>
+          <a:noFill/>
+          <a:extLst>
+            <a:ext uri="{909E8E84-426E-40DD-AFC4-6F175D3DCCD1}">
+              <a14:hiddenFill xmlns:a14="http://schemas.microsoft.com/office/drawing/2010/main">
+                <a:solidFill>
+                  <a:srgbClr val="FFFFFF"/>
+                </a:solidFill>
+              </a14:hiddenFill>
+            </a:ext>
+          </a:extLst>
+        </p:spPr>
+      </p:pic>
     </p:spTree>
     <p:extLst>
       <p:ext uri="{BB962C8B-B14F-4D97-AF65-F5344CB8AC3E}">
-        <p14:creationId xmlns:p14="http://schemas.microsoft.com/office/powerpoint/2010/main" val="4139102508"/>
+        <p14:creationId xmlns:p14="http://schemas.microsoft.com/office/powerpoint/2010/main" val="2529091547"/>
       </p:ext>
     </p:extLst>
   </p:cSld>
@@ -2771,10 +3994,10 @@
       </p:grpSpPr>
       <p:sp>
         <p:nvSpPr>
-          <p:cNvPr id="4" name="Titre 3">
-            <a:extLst>
-              <a:ext uri="{FF2B5EF4-FFF2-40B4-BE49-F238E27FC236}">
-                <a16:creationId xmlns:a16="http://schemas.microsoft.com/office/drawing/2014/main" id="{B53E8A05-42BD-489E-BF5F-958C213739DF}"/>
+          <p:cNvPr id="2" name="Titre 1">
+            <a:extLst>
+              <a:ext uri="{FF2B5EF4-FFF2-40B4-BE49-F238E27FC236}">
+                <a16:creationId xmlns:a16="http://schemas.microsoft.com/office/drawing/2014/main" id="{D02228F8-2E9C-4B7B-AAC0-587F1402131E}"/>
               </a:ext>
             </a:extLst>
           </p:cNvPr>
@@ -2782,7 +4005,7 @@
             <a:spLocks noGrp="1"/>
           </p:cNvSpPr>
           <p:nvPr>
-            <p:ph type="ctrTitle"/>
+            <p:ph type="title"/>
           </p:nvPr>
         </p:nvSpPr>
         <p:spPr/>
@@ -2792,17 +4015,17 @@
           <a:p>
             <a:r>
               <a:rPr lang="en-US" dirty="0"/>
-              <a:t>Questions?</a:t>
+              <a:t>Saliency maps</a:t>
             </a:r>
           </a:p>
         </p:txBody>
       </p:sp>
       <p:sp>
         <p:nvSpPr>
-          <p:cNvPr id="5" name="Sous-titre 4">
-            <a:extLst>
-              <a:ext uri="{FF2B5EF4-FFF2-40B4-BE49-F238E27FC236}">
-                <a16:creationId xmlns:a16="http://schemas.microsoft.com/office/drawing/2014/main" id="{CEB63DBD-0FC0-4057-AC92-1717C1D0ED55}"/>
+          <p:cNvPr id="3" name="Espace réservé du texte 2">
+            <a:extLst>
+              <a:ext uri="{FF2B5EF4-FFF2-40B4-BE49-F238E27FC236}">
+                <a16:creationId xmlns:a16="http://schemas.microsoft.com/office/drawing/2014/main" id="{AE11C3D2-6F27-4683-9631-859809B0DB72}"/>
               </a:ext>
             </a:extLst>
           </p:cNvPr>
@@ -2810,193 +4033,101 @@
             <a:spLocks noGrp="1"/>
           </p:cNvSpPr>
           <p:nvPr>
-            <p:ph type="subTitle" idx="1"/>
+            <p:ph type="body" sz="quarter" idx="10"/>
           </p:nvPr>
         </p:nvSpPr>
         <p:spPr/>
         <p:txBody>
-          <a:bodyPr>
-            <a:noAutofit/>
-          </a:bodyPr>
+          <a:bodyPr/>
           <a:lstStyle/>
           <a:p>
             <a:r>
               <a:rPr lang="en-US" dirty="0"/>
-              <a:t>Bibliography</a:t>
-            </a:r>
-            <a:br>
-              <a:rPr lang="en-US" dirty="0"/>
-            </a:br>
-            <a:r>
-              <a:rPr lang="en-US" dirty="0"/>
-              <a:t>- </a:t>
-            </a:r>
-            <a:r>
-              <a:rPr lang="en-US" sz="1800" dirty="0" err="1"/>
-              <a:t>Selvaraju</a:t>
-            </a:r>
-            <a:r>
-              <a:rPr lang="en-US" sz="1800" dirty="0"/>
-              <a:t>, R. R., Cogswell, M., Das, A., </a:t>
-            </a:r>
-            <a:r>
-              <a:rPr lang="en-US" sz="1800" dirty="0" err="1"/>
-              <a:t>Vedantam</a:t>
-            </a:r>
-            <a:r>
-              <a:rPr lang="en-US" sz="1800" dirty="0"/>
-              <a:t>, R., Parikh, D., &amp; Batra, D. (2017). Grad-cam: Visual explanations from deep networks via gradient-based localization. In Proceedings of the IEEE international conference on computer vision (pp. 618-626).</a:t>
-            </a:r>
-            <a:br>
-              <a:rPr lang="en-US" sz="1800" dirty="0"/>
-            </a:br>
-            <a:r>
-              <a:rPr lang="en-US" sz="1800" dirty="0"/>
-              <a:t>- </a:t>
-            </a:r>
-            <a:r>
-              <a:rPr lang="en-US" sz="1800" dirty="0" err="1"/>
-              <a:t>Springenberg</a:t>
-            </a:r>
-            <a:r>
-              <a:rPr lang="en-US" sz="1800" dirty="0"/>
-              <a:t>, J. T., </a:t>
-            </a:r>
-            <a:r>
-              <a:rPr lang="en-US" sz="1800" dirty="0" err="1"/>
-              <a:t>Dosovitskiy</a:t>
-            </a:r>
-            <a:r>
-              <a:rPr lang="en-US" sz="1800" dirty="0"/>
-              <a:t>, A., </a:t>
-            </a:r>
-            <a:r>
-              <a:rPr lang="en-US" sz="1800" dirty="0" err="1"/>
-              <a:t>Brox</a:t>
-            </a:r>
-            <a:r>
-              <a:rPr lang="en-US" sz="1800" dirty="0"/>
-              <a:t>, T., &amp; </a:t>
-            </a:r>
-            <a:r>
-              <a:rPr lang="en-US" sz="1800" dirty="0" err="1"/>
-              <a:t>Riedmiller</a:t>
-            </a:r>
-            <a:r>
-              <a:rPr lang="en-US" sz="1800" dirty="0"/>
-              <a:t>, M. (2014). Striving for simplicity: The all convolutional net. </a:t>
-            </a:r>
-            <a:r>
-              <a:rPr lang="en-US" sz="1800" dirty="0" err="1"/>
-              <a:t>arXiv</a:t>
-            </a:r>
-            <a:r>
-              <a:rPr lang="en-US" sz="1800" dirty="0"/>
-              <a:t> preprint arXiv:1412.6806.</a:t>
-            </a:r>
-          </a:p>
-          <a:p>
-            <a:r>
-              <a:rPr lang="en-US" sz="1400" dirty="0"/>
-              <a:t>Images and videos: unless otherwise stated, I stole them from the Internet. I hope they are not copyrighted, or that their use falls under the Fair Use clause, and if not, I am sorry. Please don’t sue me.</a:t>
+              <a:t>What are the </a:t>
+            </a:r>
+            <a:r>
+              <a:rPr lang="en-US" b="1" dirty="0"/>
+              <a:t>most important pixels</a:t>
+            </a:r>
+            <a:r>
+              <a:rPr lang="en-US" dirty="0"/>
+              <a:t> for the decision?</a:t>
+            </a:r>
+          </a:p>
+          <a:p>
+            <a:pPr lvl="1"/>
+            <a:r>
+              <a:rPr lang="en-US" dirty="0"/>
+              <a:t>Forward pass of an image through the network</a:t>
+            </a:r>
+          </a:p>
+          <a:p>
+            <a:pPr lvl="1"/>
+            <a:r>
+              <a:rPr lang="en-US" dirty="0"/>
+              <a:t>Take relevant output (classification: tensor value for target class)</a:t>
+            </a:r>
+          </a:p>
+          <a:p>
+            <a:pPr lvl="1"/>
+            <a:r>
+              <a:rPr lang="en-US" dirty="0"/>
+              <a:t>Compute derivative of that output </a:t>
+            </a:r>
+            <a:r>
+              <a:rPr lang="en-US" dirty="0" err="1"/>
+              <a:t>w.r.t.</a:t>
+            </a:r>
+            <a:r>
+              <a:rPr lang="en-US" dirty="0"/>
+              <a:t> to </a:t>
+            </a:r>
+            <a:r>
+              <a:rPr lang="en-US" i="1" dirty="0"/>
+              <a:t>pixels </a:t>
+            </a:r>
+            <a:r>
+              <a:rPr lang="en-US" dirty="0"/>
+              <a:t>(backward pass)</a:t>
+            </a:r>
+          </a:p>
+          <a:p>
+            <a:endParaRPr lang="en-US" dirty="0"/>
+          </a:p>
+          <a:p>
+            <a:r>
+              <a:rPr lang="en-US" dirty="0"/>
+              <a:t>Pixels with </a:t>
+            </a:r>
+            <a:r>
+              <a:rPr lang="en-US" b="1" dirty="0"/>
+              <a:t>high values of gradient</a:t>
+            </a:r>
+            <a:r>
+              <a:rPr lang="en-US" dirty="0"/>
+              <a:t> are more important</a:t>
+            </a:r>
+          </a:p>
+          <a:p>
+            <a:pPr lvl="1"/>
+            <a:r>
+              <a:rPr lang="en-US" dirty="0"/>
+              <a:t>Changing their value might greatly impact decision</a:t>
+            </a:r>
+          </a:p>
+          <a:p>
+            <a:pPr lvl="1"/>
+            <a:r>
+              <a:rPr lang="en-US" dirty="0"/>
+              <a:t>Visualize which pixels impact decision the most</a:t>
             </a:r>
           </a:p>
         </p:txBody>
       </p:sp>
-      <p:pic>
-        <p:nvPicPr>
-          <p:cNvPr id="6" name="Picture 2">
-            <a:extLst>
-              <a:ext uri="{FF2B5EF4-FFF2-40B4-BE49-F238E27FC236}">
-                <a16:creationId xmlns:a16="http://schemas.microsoft.com/office/drawing/2014/main" id="{6E214693-AB7E-4C54-8D7C-0391735F7C4F}"/>
-              </a:ext>
-            </a:extLst>
-          </p:cNvPr>
-          <p:cNvPicPr>
-            <a:picLocks noChangeAspect="1" noChangeArrowheads="1"/>
-          </p:cNvPicPr>
-          <p:nvPr/>
-        </p:nvPicPr>
-        <p:blipFill rotWithShape="1">
-          <a:blip r:embed="rId2" cstate="print">
-            <a:extLst>
-              <a:ext uri="{BEBA8EAE-BF5A-486C-A8C5-ECC9F3942E4B}">
-                <a14:imgProps xmlns:a14="http://schemas.microsoft.com/office/drawing/2010/main">
-                  <a14:imgLayer r:embed="rId3">
-                    <a14:imgEffect>
-                      <a14:backgroundRemoval t="22283" b="75673" l="54554" r="90983"/>
-                    </a14:imgEffect>
-                  </a14:imgLayer>
-                </a14:imgProps>
-              </a:ext>
-              <a:ext uri="{28A0092B-C50C-407E-A947-70E740481C1C}">
-                <a14:useLocalDpi xmlns:a14="http://schemas.microsoft.com/office/drawing/2010/main" val="0"/>
-              </a:ext>
-            </a:extLst>
-          </a:blip>
-          <a:srcRect l="50000" t="15610" r="4463" b="17653"/>
-          <a:stretch/>
-        </p:blipFill>
-        <p:spPr bwMode="auto">
-          <a:xfrm>
-            <a:off x="4938382" y="1037974"/>
-            <a:ext cx="1295445" cy="884352"/>
-          </a:xfrm>
-          <a:prstGeom prst="rect">
-            <a:avLst/>
-          </a:prstGeom>
-          <a:noFill/>
-          <a:extLst>
-            <a:ext uri="{909E8E84-426E-40DD-AFC4-6F175D3DCCD1}">
-              <a14:hiddenFill xmlns:a14="http://schemas.microsoft.com/office/drawing/2010/main">
-                <a:solidFill>
-                  <a:srgbClr val="FFFFFF"/>
-                </a:solidFill>
-              </a14:hiddenFill>
-            </a:ext>
-          </a:extLst>
-        </p:spPr>
-      </p:pic>
-      <p:pic>
-        <p:nvPicPr>
-          <p:cNvPr id="7" name="Image 6">
-            <a:extLst>
-              <a:ext uri="{FF2B5EF4-FFF2-40B4-BE49-F238E27FC236}">
-                <a16:creationId xmlns:a16="http://schemas.microsoft.com/office/drawing/2014/main" id="{414D43F9-35B6-46FA-B5D4-8F2F1AA72ED1}"/>
-              </a:ext>
-            </a:extLst>
-          </p:cNvPr>
-          <p:cNvPicPr>
-            <a:picLocks noChangeAspect="1"/>
-          </p:cNvPicPr>
-          <p:nvPr/>
-        </p:nvPicPr>
-        <p:blipFill>
-          <a:blip r:embed="rId4">
-            <a:extLst>
-              <a:ext uri="{28A0092B-C50C-407E-A947-70E740481C1C}">
-                <a14:useLocalDpi xmlns:a14="http://schemas.microsoft.com/office/drawing/2010/main" val="0"/>
-              </a:ext>
-            </a:extLst>
-          </a:blip>
-          <a:stretch>
-            <a:fillRect/>
-          </a:stretch>
-        </p:blipFill>
-        <p:spPr>
-          <a:xfrm>
-            <a:off x="6383826" y="1073027"/>
-            <a:ext cx="1642424" cy="574848"/>
-          </a:xfrm>
-          <a:prstGeom prst="rect">
-            <a:avLst/>
-          </a:prstGeom>
-        </p:spPr>
-      </p:pic>
     </p:spTree>
     <p:extLst>
       <p:ext uri="{BB962C8B-B14F-4D97-AF65-F5344CB8AC3E}">
-        <p14:creationId xmlns:p14="http://schemas.microsoft.com/office/powerpoint/2010/main" val="938009228"/>
+        <p14:creationId xmlns:p14="http://schemas.microsoft.com/office/powerpoint/2010/main" val="1702120084"/>
       </p:ext>
     </p:extLst>
   </p:cSld>

</xml_diff>